<commit_message>
updated, integrated some recommended changes
</commit_message>
<xml_diff>
--- a/presentation/nonlinearLSTM_slides.pptx
+++ b/presentation/nonlinearLSTM_slides.pptx
@@ -12,33 +12,33 @@
   </p:handoutMasterIdLst>
   <p:sldIdLst>
     <p:sldId id="413" r:id="rId5"/>
-    <p:sldId id="389" r:id="rId6"/>
-    <p:sldId id="418" r:id="rId7"/>
-    <p:sldId id="448" r:id="rId8"/>
-    <p:sldId id="449" r:id="rId9"/>
-    <p:sldId id="450" r:id="rId10"/>
-    <p:sldId id="447" r:id="rId11"/>
-    <p:sldId id="452" r:id="rId12"/>
-    <p:sldId id="451" r:id="rId13"/>
-    <p:sldId id="453" r:id="rId14"/>
-    <p:sldId id="457" r:id="rId15"/>
-    <p:sldId id="454" r:id="rId16"/>
-    <p:sldId id="458" r:id="rId17"/>
-    <p:sldId id="459" r:id="rId18"/>
-    <p:sldId id="461" r:id="rId19"/>
-    <p:sldId id="460" r:id="rId20"/>
-    <p:sldId id="462" r:id="rId21"/>
-    <p:sldId id="463" r:id="rId22"/>
-    <p:sldId id="464" r:id="rId23"/>
-    <p:sldId id="465" r:id="rId24"/>
-    <p:sldId id="466" r:id="rId25"/>
-    <p:sldId id="467" r:id="rId26"/>
-    <p:sldId id="456" r:id="rId27"/>
-    <p:sldId id="469" r:id="rId28"/>
-    <p:sldId id="470" r:id="rId29"/>
-    <p:sldId id="471" r:id="rId30"/>
-    <p:sldId id="468" r:id="rId31"/>
-    <p:sldId id="473" r:id="rId32"/>
+    <p:sldId id="475" r:id="rId6"/>
+    <p:sldId id="389" r:id="rId7"/>
+    <p:sldId id="418" r:id="rId8"/>
+    <p:sldId id="448" r:id="rId9"/>
+    <p:sldId id="449" r:id="rId10"/>
+    <p:sldId id="450" r:id="rId11"/>
+    <p:sldId id="447" r:id="rId12"/>
+    <p:sldId id="452" r:id="rId13"/>
+    <p:sldId id="451" r:id="rId14"/>
+    <p:sldId id="453" r:id="rId15"/>
+    <p:sldId id="457" r:id="rId16"/>
+    <p:sldId id="454" r:id="rId17"/>
+    <p:sldId id="458" r:id="rId18"/>
+    <p:sldId id="459" r:id="rId19"/>
+    <p:sldId id="461" r:id="rId20"/>
+    <p:sldId id="460" r:id="rId21"/>
+    <p:sldId id="462" r:id="rId22"/>
+    <p:sldId id="463" r:id="rId23"/>
+    <p:sldId id="464" r:id="rId24"/>
+    <p:sldId id="465" r:id="rId25"/>
+    <p:sldId id="466" r:id="rId26"/>
+    <p:sldId id="467" r:id="rId27"/>
+    <p:sldId id="456" r:id="rId28"/>
+    <p:sldId id="469" r:id="rId29"/>
+    <p:sldId id="470" r:id="rId30"/>
+    <p:sldId id="471" r:id="rId31"/>
+    <p:sldId id="468" r:id="rId32"/>
     <p:sldId id="412" r:id="rId33"/>
     <p:sldId id="474" r:id="rId34"/>
     <p:sldId id="472" r:id="rId35"/>
@@ -246,7 +246,7 @@
           <a:p>
             <a:fld id="{C88CE87A-16FF-4C7D-8292-0CB980715C8B}" type="datetimeFigureOut">
               <a:rPr lang="de-DE" smtClean="0"/>
-              <a:t>15.12.2022</a:t>
+              <a:t>10.01.2023</a:t>
             </a:fld>
             <a:endParaRPr lang="de-DE"/>
           </a:p>
@@ -324,7 +324,7 @@
           <a:p>
             <a:fld id="{252F6222-CCA6-4FA7-88E0-B7BAE53645AA}" type="slidenum">
               <a:rPr lang="de-DE" smtClean="0"/>
-              <a:t>‹#›</a:t>
+              <a:t>‹Nr.›</a:t>
             </a:fld>
             <a:endParaRPr lang="de-DE"/>
           </a:p>
@@ -423,7 +423,7 @@
           <a:p>
             <a:fld id="{9DECA62E-2216-4960-A875-4D2633F4A404}" type="datetimeFigureOut">
               <a:rPr lang="de-DE" smtClean="0"/>
-              <a:t>15.12.2022</a:t>
+              <a:t>10.01.2023</a:t>
             </a:fld>
             <a:endParaRPr lang="de-DE"/>
           </a:p>
@@ -581,7 +581,7 @@
           <a:p>
             <a:fld id="{E1F93703-73BA-47D5-8B02-C172375928DA}" type="slidenum">
               <a:rPr lang="de-DE" smtClean="0"/>
-              <a:t>‹#›</a:t>
+              <a:t>‹Nr.›</a:t>
             </a:fld>
             <a:endParaRPr lang="de-DE"/>
           </a:p>
@@ -690,6 +690,110 @@
 </p:notesMaster>
 </file>
 
+<file path=ppt/notesSlides/notesSlide1.xml><?xml version="1.0" encoding="utf-8"?>
+<p:notes xmlns:a="http://schemas.openxmlformats.org/drawingml/2006/main" xmlns:r="http://schemas.openxmlformats.org/officeDocument/2006/relationships" xmlns:p="http://schemas.openxmlformats.org/presentationml/2006/main">
+  <p:cSld>
+    <p:spTree>
+      <p:nvGrpSpPr>
+        <p:cNvPr id="1" name=""/>
+        <p:cNvGrpSpPr/>
+        <p:nvPr/>
+      </p:nvGrpSpPr>
+      <p:grpSpPr>
+        <a:xfrm>
+          <a:off x="0" y="0"/>
+          <a:ext cx="0" cy="0"/>
+          <a:chOff x="0" y="0"/>
+          <a:chExt cx="0" cy="0"/>
+        </a:xfrm>
+      </p:grpSpPr>
+      <p:sp>
+        <p:nvSpPr>
+          <p:cNvPr id="2" name="Folienbildplatzhalter 1"/>
+          <p:cNvSpPr>
+            <a:spLocks noGrp="1" noRot="1" noChangeAspect="1"/>
+          </p:cNvSpPr>
+          <p:nvPr>
+            <p:ph type="sldImg"/>
+          </p:nvPr>
+        </p:nvSpPr>
+        <p:spPr/>
+      </p:sp>
+      <p:sp>
+        <p:nvSpPr>
+          <p:cNvPr id="3" name="Notizenplatzhalter 2"/>
+          <p:cNvSpPr>
+            <a:spLocks noGrp="1"/>
+          </p:cNvSpPr>
+          <p:nvPr>
+            <p:ph type="body" idx="1"/>
+          </p:nvPr>
+        </p:nvSpPr>
+        <p:spPr/>
+        <p:txBody>
+          <a:bodyPr/>
+          <a:lstStyle/>
+          <a:p>
+            <a:pPr marL="0" marR="0" lvl="0" indent="0" algn="l" defTabSz="914400" rtl="0" eaLnBrk="1" fontAlgn="auto" latinLnBrk="0" hangingPunct="1">
+              <a:lnSpc>
+                <a:spcPct val="100000"/>
+              </a:lnSpc>
+              <a:spcBef>
+                <a:spcPts val="0"/>
+              </a:spcBef>
+              <a:spcAft>
+                <a:spcPts val="0"/>
+              </a:spcAft>
+              <a:buClrTx/>
+              <a:buSzTx/>
+              <a:buFontTx/>
+              <a:buNone/>
+              <a:tabLst/>
+              <a:defRPr/>
+            </a:pPr>
+            <a:r>
+              <a:rPr lang="en-US" dirty="0"/>
+              <a:t>Create better dataset to test specific situations</a:t>
+            </a:r>
+          </a:p>
+        </p:txBody>
+      </p:sp>
+      <p:sp>
+        <p:nvSpPr>
+          <p:cNvPr id="4" name="Foliennummernplatzhalter 3"/>
+          <p:cNvSpPr>
+            <a:spLocks noGrp="1"/>
+          </p:cNvSpPr>
+          <p:nvPr>
+            <p:ph type="sldNum" sz="quarter" idx="5"/>
+          </p:nvPr>
+        </p:nvSpPr>
+        <p:spPr/>
+        <p:txBody>
+          <a:bodyPr/>
+          <a:lstStyle/>
+          <a:p>
+            <a:fld id="{E1F93703-73BA-47D5-8B02-C172375928DA}" type="slidenum">
+              <a:rPr lang="de-DE" smtClean="0"/>
+              <a:t>28</a:t>
+            </a:fld>
+            <a:endParaRPr lang="de-DE"/>
+          </a:p>
+        </p:txBody>
+      </p:sp>
+    </p:spTree>
+    <p:extLst>
+      <p:ext uri="{BB962C8B-B14F-4D97-AF65-F5344CB8AC3E}">
+        <p14:creationId xmlns:p14="http://schemas.microsoft.com/office/powerpoint/2010/main" val="238023975"/>
+      </p:ext>
+    </p:extLst>
+  </p:cSld>
+  <p:clrMapOvr>
+    <a:masterClrMapping/>
+  </p:clrMapOvr>
+</p:notes>
+</file>
+
 <file path=ppt/slideLayouts/slideLayout1.xml><?xml version="1.0" encoding="utf-8"?>
 <p:sldLayout xmlns:a="http://schemas.openxmlformats.org/drawingml/2006/main" xmlns:r="http://schemas.openxmlformats.org/officeDocument/2006/relationships" xmlns:p="http://schemas.openxmlformats.org/presentationml/2006/main" preserve="1" userDrawn="1">
   <p:cSld name="Titelfolie 1">
@@ -819,10 +923,10 @@
           <a:bodyPr/>
           <a:lstStyle/>
           <a:p>
-            <a:fld id="{B8015DB5-16FE-4380-B5BF-46CD18C131D7}" type="datetime8">
-              <a:rPr lang="en-DE" smtClean="0"/>
-              <a:t>15/12/2022 12:38</a:t>
-            </a:fld>
+            <a:r>
+              <a:rPr lang="LID4096"/>
+              <a:t>12/01/2023</a:t>
+            </a:r>
             <a:endParaRPr lang="de-DE" dirty="0"/>
           </a:p>
         </p:txBody>
@@ -880,7 +984,7 @@
             <a:fld id="{D949F9DF-37BD-4CD6-BF49-65BA579E1D7A}" type="slidenum">
               <a:rPr lang="de-DE" smtClean="0"/>
               <a:pPr/>
-              <a:t>‹#›</a:t>
+              <a:t>‹Nr.›</a:t>
             </a:fld>
             <a:endParaRPr lang="de-DE"/>
           </a:p>
@@ -2298,10 +2402,10 @@
             </a:lvl1pPr>
           </a:lstStyle>
           <a:p>
-            <a:fld id="{A2E8877F-2015-4290-957C-06EF82A52242}" type="datetime8">
-              <a:rPr lang="en-DE" smtClean="0"/>
-              <a:t>15/12/2022 12:38</a:t>
-            </a:fld>
+            <a:r>
+              <a:rPr lang="LID4096"/>
+              <a:t>12/01/2023</a:t>
+            </a:r>
             <a:endParaRPr lang="de-DE" dirty="0"/>
           </a:p>
         </p:txBody>
@@ -2380,7 +2484,7 @@
             <a:fld id="{D949F9DF-37BD-4CD6-BF49-65BA579E1D7A}" type="slidenum">
               <a:rPr lang="de-DE" smtClean="0"/>
               <a:pPr/>
-              <a:t>‹#›</a:t>
+              <a:t>‹Nr.›</a:t>
             </a:fld>
             <a:endParaRPr lang="de-DE"/>
           </a:p>
@@ -3976,10 +4080,10 @@
             </a:lvl1pPr>
           </a:lstStyle>
           <a:p>
-            <a:fld id="{2E7C052D-61E6-45C2-BA19-CFB3925CB63C}" type="datetime8">
-              <a:rPr lang="en-DE" smtClean="0"/>
-              <a:t>15/12/2022 12:38</a:t>
-            </a:fld>
+            <a:r>
+              <a:rPr lang="LID4096"/>
+              <a:t>12/01/2023</a:t>
+            </a:r>
             <a:endParaRPr lang="de-DE" dirty="0"/>
           </a:p>
         </p:txBody>
@@ -4053,7 +4157,7 @@
             <a:fld id="{D949F9DF-37BD-4CD6-BF49-65BA579E1D7A}" type="slidenum">
               <a:rPr lang="de-DE" smtClean="0"/>
               <a:pPr/>
-              <a:t>‹#›</a:t>
+              <a:t>‹Nr.›</a:t>
             </a:fld>
             <a:endParaRPr lang="de-DE"/>
           </a:p>
@@ -7027,10 +7131,10 @@
             </a:lvl1pPr>
           </a:lstStyle>
           <a:p>
-            <a:fld id="{E98A7CA8-B4F8-4103-AA95-845AE462A37A}" type="datetime8">
-              <a:rPr lang="en-DE" smtClean="0"/>
-              <a:t>15/12/2022 12:38</a:t>
-            </a:fld>
+            <a:r>
+              <a:rPr lang="LID4096"/>
+              <a:t>12/01/2023</a:t>
+            </a:r>
             <a:endParaRPr lang="de-DE" dirty="0"/>
           </a:p>
         </p:txBody>
@@ -7124,7 +7228,7 @@
             <a:fld id="{D949F9DF-37BD-4CD6-BF49-65BA579E1D7A}" type="slidenum">
               <a:rPr lang="de-DE" smtClean="0"/>
               <a:pPr/>
-              <a:t>‹#›</a:t>
+              <a:t>‹Nr.›</a:t>
             </a:fld>
             <a:endParaRPr lang="de-DE"/>
           </a:p>
@@ -9000,7 +9104,7 @@
             </a:pPr>
             <a:r>
               <a:rPr lang="de-DE" sz="2000" dirty="0"/>
-              <a:t>Sebastian Hirt | 20.10.2022</a:t>
+              <a:t>Sebastian Hirt | 12.01.2023</a:t>
             </a:r>
           </a:p>
           <a:p>
@@ -9067,10 +9171,10 @@
           <a:bodyPr/>
           <a:lstStyle/>
           <a:p>
-            <a:fld id="{A2E8877F-2015-4290-957C-06EF82A52242}" type="datetime8">
-              <a:rPr lang="en-DE" smtClean="0"/>
-              <a:t>15/12/2022 12:38</a:t>
-            </a:fld>
+            <a:r>
+              <a:rPr lang="LID4096"/>
+              <a:t>12/01/2023</a:t>
+            </a:r>
             <a:endParaRPr lang="de-DE" dirty="0"/>
           </a:p>
         </p:txBody>
@@ -9129,6 +9233,245 @@
               <a:rPr lang="de-DE" smtClean="0"/>
               <a:pPr/>
               <a:t>10</a:t>
+            </a:fld>
+            <a:endParaRPr lang="de-DE"/>
+          </a:p>
+        </p:txBody>
+      </p:sp>
+      <p:sp>
+        <p:nvSpPr>
+          <p:cNvPr id="5" name="Title 4">
+            <a:extLst>
+              <a:ext uri="{FF2B5EF4-FFF2-40B4-BE49-F238E27FC236}">
+                <a16:creationId xmlns:a16="http://schemas.microsoft.com/office/drawing/2014/main" id="{BBB354EA-F495-6050-38E7-B27B0D727096}"/>
+              </a:ext>
+            </a:extLst>
+          </p:cNvPr>
+          <p:cNvSpPr>
+            <a:spLocks noGrp="1"/>
+          </p:cNvSpPr>
+          <p:nvPr>
+            <p:ph type="title"/>
+          </p:nvPr>
+        </p:nvSpPr>
+        <p:spPr/>
+        <p:txBody>
+          <a:bodyPr/>
+          <a:lstStyle/>
+          <a:p>
+            <a:r>
+              <a:rPr lang="en-US" dirty="0"/>
+              <a:t>Problem description</a:t>
+            </a:r>
+          </a:p>
+        </p:txBody>
+      </p:sp>
+      <p:sp>
+        <p:nvSpPr>
+          <p:cNvPr id="6" name="Text Placeholder 5">
+            <a:extLst>
+              <a:ext uri="{FF2B5EF4-FFF2-40B4-BE49-F238E27FC236}">
+                <a16:creationId xmlns:a16="http://schemas.microsoft.com/office/drawing/2014/main" id="{4761E152-B7EF-00B5-47FF-110705BBE7D4}"/>
+              </a:ext>
+            </a:extLst>
+          </p:cNvPr>
+          <p:cNvSpPr>
+            <a:spLocks noGrp="1"/>
+          </p:cNvSpPr>
+          <p:nvPr>
+            <p:ph type="body" sz="quarter" idx="17"/>
+          </p:nvPr>
+        </p:nvSpPr>
+        <p:spPr/>
+        <p:txBody>
+          <a:bodyPr/>
+          <a:lstStyle/>
+          <a:p>
+            <a:r>
+              <a:rPr lang="en-US" sz="1800" dirty="0">
+                <a:effectLst/>
+                <a:latin typeface="Calibri" panose="020F0502020204030204" pitchFamily="34" charset="0"/>
+                <a:ea typeface="Calibri" panose="020F0502020204030204" pitchFamily="34" charset="0"/>
+                <a:cs typeface="Arial" panose="020B0604020202020204" pitchFamily="34" charset="0"/>
+              </a:rPr>
+              <a:t>Pushing force on object</a:t>
+            </a:r>
+          </a:p>
+          <a:p>
+            <a:r>
+              <a:rPr lang="en-US" dirty="0">
+                <a:latin typeface="Calibri" panose="020F0502020204030204" pitchFamily="34" charset="0"/>
+                <a:ea typeface="Calibri" panose="020F0502020204030204" pitchFamily="34" charset="0"/>
+                <a:cs typeface="Arial" panose="020B0604020202020204" pitchFamily="34" charset="0"/>
+              </a:rPr>
+              <a:t>Drag on object</a:t>
+            </a:r>
+            <a:endParaRPr lang="en-US" sz="1800" dirty="0">
+              <a:effectLst/>
+              <a:latin typeface="Calibri" panose="020F0502020204030204" pitchFamily="34" charset="0"/>
+              <a:ea typeface="Calibri" panose="020F0502020204030204" pitchFamily="34" charset="0"/>
+              <a:cs typeface="Arial" panose="020B0604020202020204" pitchFamily="34" charset="0"/>
+            </a:endParaRPr>
+          </a:p>
+          <a:p>
+            <a:endParaRPr lang="en-US" sz="1800" dirty="0">
+              <a:effectLst/>
+              <a:latin typeface="Calibri" panose="020F0502020204030204" pitchFamily="34" charset="0"/>
+              <a:ea typeface="Calibri" panose="020F0502020204030204" pitchFamily="34" charset="0"/>
+              <a:cs typeface="Arial" panose="020B0604020202020204" pitchFamily="34" charset="0"/>
+            </a:endParaRPr>
+          </a:p>
+          <a:p>
+            <a:endParaRPr lang="en-US" dirty="0"/>
+          </a:p>
+          <a:p>
+            <a:endParaRPr lang="en-US" dirty="0"/>
+          </a:p>
+        </p:txBody>
+      </p:sp>
+      <p:pic>
+        <p:nvPicPr>
+          <p:cNvPr id="8" name="Picture 7">
+            <a:extLst>
+              <a:ext uri="{FF2B5EF4-FFF2-40B4-BE49-F238E27FC236}">
+                <a16:creationId xmlns:a16="http://schemas.microsoft.com/office/drawing/2014/main" id="{6F9EFDD3-455A-5D88-E91B-55A19B6A2BBD}"/>
+              </a:ext>
+            </a:extLst>
+          </p:cNvPr>
+          <p:cNvPicPr>
+            <a:picLocks noChangeAspect="1"/>
+          </p:cNvPicPr>
+          <p:nvPr/>
+        </p:nvPicPr>
+        <p:blipFill>
+          <a:blip r:embed="rId2"/>
+          <a:stretch>
+            <a:fillRect/>
+          </a:stretch>
+        </p:blipFill>
+        <p:spPr>
+          <a:xfrm>
+            <a:off x="5500915" y="2089245"/>
+            <a:ext cx="4914238" cy="3538785"/>
+          </a:xfrm>
+          <a:prstGeom prst="rect">
+            <a:avLst/>
+          </a:prstGeom>
+        </p:spPr>
+      </p:pic>
+    </p:spTree>
+    <p:extLst>
+      <p:ext uri="{BB962C8B-B14F-4D97-AF65-F5344CB8AC3E}">
+        <p14:creationId xmlns:p14="http://schemas.microsoft.com/office/powerpoint/2010/main" val="637827353"/>
+      </p:ext>
+    </p:extLst>
+  </p:cSld>
+  <p:clrMapOvr>
+    <a:masterClrMapping/>
+  </p:clrMapOvr>
+</p:sld>
+</file>
+
+<file path=ppt/slides/slide11.xml><?xml version="1.0" encoding="utf-8"?>
+<p:sld xmlns:a="http://schemas.openxmlformats.org/drawingml/2006/main" xmlns:r="http://schemas.openxmlformats.org/officeDocument/2006/relationships" xmlns:p="http://schemas.openxmlformats.org/presentationml/2006/main">
+  <p:cSld>
+    <p:spTree>
+      <p:nvGrpSpPr>
+        <p:cNvPr id="1" name=""/>
+        <p:cNvGrpSpPr/>
+        <p:nvPr/>
+      </p:nvGrpSpPr>
+      <p:grpSpPr>
+        <a:xfrm>
+          <a:off x="0" y="0"/>
+          <a:ext cx="0" cy="0"/>
+          <a:chOff x="0" y="0"/>
+          <a:chExt cx="0" cy="0"/>
+        </a:xfrm>
+      </p:grpSpPr>
+      <p:sp>
+        <p:nvSpPr>
+          <p:cNvPr id="2" name="Date Placeholder 1">
+            <a:extLst>
+              <a:ext uri="{FF2B5EF4-FFF2-40B4-BE49-F238E27FC236}">
+                <a16:creationId xmlns:a16="http://schemas.microsoft.com/office/drawing/2014/main" id="{2B8CAAFC-F0E6-F31E-198A-AA24CC49C316}"/>
+              </a:ext>
+            </a:extLst>
+          </p:cNvPr>
+          <p:cNvSpPr>
+            <a:spLocks noGrp="1"/>
+          </p:cNvSpPr>
+          <p:nvPr>
+            <p:ph type="dt" sz="half" idx="10"/>
+          </p:nvPr>
+        </p:nvSpPr>
+        <p:spPr/>
+        <p:txBody>
+          <a:bodyPr/>
+          <a:lstStyle/>
+          <a:p>
+            <a:r>
+              <a:rPr lang="LID4096"/>
+              <a:t>12/01/2023</a:t>
+            </a:r>
+            <a:endParaRPr lang="de-DE" dirty="0"/>
+          </a:p>
+        </p:txBody>
+      </p:sp>
+      <p:sp>
+        <p:nvSpPr>
+          <p:cNvPr id="3" name="Footer Placeholder 2">
+            <a:extLst>
+              <a:ext uri="{FF2B5EF4-FFF2-40B4-BE49-F238E27FC236}">
+                <a16:creationId xmlns:a16="http://schemas.microsoft.com/office/drawing/2014/main" id="{C49146C1-0EFA-7410-35A6-1C2B33E3E160}"/>
+              </a:ext>
+            </a:extLst>
+          </p:cNvPr>
+          <p:cNvSpPr>
+            <a:spLocks noGrp="1"/>
+          </p:cNvSpPr>
+          <p:nvPr>
+            <p:ph type="ftr" sz="quarter" idx="11"/>
+          </p:nvPr>
+        </p:nvSpPr>
+        <p:spPr/>
+        <p:txBody>
+          <a:bodyPr/>
+          <a:lstStyle/>
+          <a:p>
+            <a:r>
+              <a:rPr lang="en-US"/>
+              <a:t>Modeling of nonlinear Systems with LSTMs | Sebastian Hirt</a:t>
+            </a:r>
+            <a:endParaRPr lang="de-DE" dirty="0"/>
+          </a:p>
+        </p:txBody>
+      </p:sp>
+      <p:sp>
+        <p:nvSpPr>
+          <p:cNvPr id="4" name="Slide Number Placeholder 3">
+            <a:extLst>
+              <a:ext uri="{FF2B5EF4-FFF2-40B4-BE49-F238E27FC236}">
+                <a16:creationId xmlns:a16="http://schemas.microsoft.com/office/drawing/2014/main" id="{83EEE9A2-09B3-BA3D-B64B-856A8F226637}"/>
+              </a:ext>
+            </a:extLst>
+          </p:cNvPr>
+          <p:cNvSpPr>
+            <a:spLocks noGrp="1"/>
+          </p:cNvSpPr>
+          <p:nvPr>
+            <p:ph type="sldNum" sz="quarter" idx="12"/>
+          </p:nvPr>
+        </p:nvSpPr>
+        <p:spPr/>
+        <p:txBody>
+          <a:bodyPr/>
+          <a:lstStyle/>
+          <a:p>
+            <a:fld id="{D949F9DF-37BD-4CD6-BF49-65BA579E1D7A}" type="slidenum">
+              <a:rPr lang="de-DE" smtClean="0"/>
+              <a:pPr/>
+              <a:t>11</a:t>
             </a:fld>
             <a:endParaRPr lang="de-DE"/>
           </a:p>
@@ -9252,7 +9595,7 @@
 </p:sld>
 </file>
 
-<file path=ppt/slides/slide11.xml><?xml version="1.0" encoding="utf-8"?>
+<file path=ppt/slides/slide12.xml><?xml version="1.0" encoding="utf-8"?>
 <p:sld xmlns:a="http://schemas.openxmlformats.org/drawingml/2006/main" xmlns:r="http://schemas.openxmlformats.org/officeDocument/2006/relationships" xmlns:p="http://schemas.openxmlformats.org/presentationml/2006/main">
   <p:cSld>
     <p:spTree>
@@ -9290,10 +9633,10 @@
           <a:bodyPr/>
           <a:lstStyle/>
           <a:p>
-            <a:fld id="{A2E8877F-2015-4290-957C-06EF82A52242}" type="datetime8">
-              <a:rPr lang="en-DE" smtClean="0"/>
-              <a:t>15/12/2022 12:38</a:t>
-            </a:fld>
+            <a:r>
+              <a:rPr lang="LID4096"/>
+              <a:t>12/01/2023</a:t>
+            </a:r>
             <a:endParaRPr lang="de-DE" dirty="0"/>
           </a:p>
         </p:txBody>
@@ -9351,7 +9694,7 @@
             <a:fld id="{D949F9DF-37BD-4CD6-BF49-65BA579E1D7A}" type="slidenum">
               <a:rPr lang="de-DE" smtClean="0"/>
               <a:pPr/>
-              <a:t>11</a:t>
+              <a:t>12</a:t>
             </a:fld>
             <a:endParaRPr lang="de-DE"/>
           </a:p>
@@ -9475,7 +9818,7 @@
 </p:sld>
 </file>
 
-<file path=ppt/slides/slide12.xml><?xml version="1.0" encoding="utf-8"?>
+<file path=ppt/slides/slide13.xml><?xml version="1.0" encoding="utf-8"?>
 <p:sld xmlns:a="http://schemas.openxmlformats.org/drawingml/2006/main" xmlns:r="http://schemas.openxmlformats.org/officeDocument/2006/relationships" xmlns:p="http://schemas.openxmlformats.org/presentationml/2006/main">
   <p:cSld>
     <p:spTree>
@@ -9513,10 +9856,10 @@
           <a:bodyPr/>
           <a:lstStyle/>
           <a:p>
-            <a:fld id="{A2E8877F-2015-4290-957C-06EF82A52242}" type="datetime8">
-              <a:rPr lang="en-DE" smtClean="0"/>
-              <a:t>15/12/2022 12:38</a:t>
-            </a:fld>
+            <a:r>
+              <a:rPr lang="LID4096"/>
+              <a:t>12/01/2023</a:t>
+            </a:r>
             <a:endParaRPr lang="de-DE" dirty="0"/>
           </a:p>
         </p:txBody>
@@ -9574,7 +9917,7 @@
             <a:fld id="{D949F9DF-37BD-4CD6-BF49-65BA579E1D7A}" type="slidenum">
               <a:rPr lang="de-DE" smtClean="0"/>
               <a:pPr/>
-              <a:t>12</a:t>
+              <a:t>13</a:t>
             </a:fld>
             <a:endParaRPr lang="de-DE"/>
           </a:p>
@@ -9709,7 +10052,7 @@
 </p:sld>
 </file>
 
-<file path=ppt/slides/slide13.xml><?xml version="1.0" encoding="utf-8"?>
+<file path=ppt/slides/slide14.xml><?xml version="1.0" encoding="utf-8"?>
 <p:sld xmlns:a="http://schemas.openxmlformats.org/drawingml/2006/main" xmlns:r="http://schemas.openxmlformats.org/officeDocument/2006/relationships" xmlns:p="http://schemas.openxmlformats.org/presentationml/2006/main">
   <p:cSld>
     <p:spTree>
@@ -9747,10 +10090,10 @@
           <a:bodyPr/>
           <a:lstStyle/>
           <a:p>
-            <a:fld id="{A2E8877F-2015-4290-957C-06EF82A52242}" type="datetime8">
-              <a:rPr lang="en-DE" smtClean="0"/>
-              <a:t>15/12/2022 12:38</a:t>
-            </a:fld>
+            <a:r>
+              <a:rPr lang="LID4096"/>
+              <a:t>12/01/2023</a:t>
+            </a:r>
             <a:endParaRPr lang="de-DE" dirty="0"/>
           </a:p>
         </p:txBody>
@@ -9808,7 +10151,7 @@
             <a:fld id="{D949F9DF-37BD-4CD6-BF49-65BA579E1D7A}" type="slidenum">
               <a:rPr lang="de-DE" smtClean="0"/>
               <a:pPr/>
-              <a:t>13</a:t>
+              <a:t>14</a:t>
             </a:fld>
             <a:endParaRPr lang="de-DE"/>
           </a:p>
@@ -9962,7 +10305,7 @@
 </p:sld>
 </file>
 
-<file path=ppt/slides/slide14.xml><?xml version="1.0" encoding="utf-8"?>
+<file path=ppt/slides/slide15.xml><?xml version="1.0" encoding="utf-8"?>
 <p:sld xmlns:a="http://schemas.openxmlformats.org/drawingml/2006/main" xmlns:r="http://schemas.openxmlformats.org/officeDocument/2006/relationships" xmlns:p="http://schemas.openxmlformats.org/presentationml/2006/main">
   <p:cSld>
     <p:spTree>
@@ -10000,10 +10343,10 @@
           <a:bodyPr/>
           <a:lstStyle/>
           <a:p>
-            <a:fld id="{A2E8877F-2015-4290-957C-06EF82A52242}" type="datetime8">
-              <a:rPr lang="en-DE" smtClean="0"/>
-              <a:t>15/12/2022 12:38</a:t>
-            </a:fld>
+            <a:r>
+              <a:rPr lang="LID4096"/>
+              <a:t>12/01/2023</a:t>
+            </a:r>
             <a:endParaRPr lang="de-DE" dirty="0"/>
           </a:p>
         </p:txBody>
@@ -10061,7 +10404,7 @@
             <a:fld id="{D949F9DF-37BD-4CD6-BF49-65BA579E1D7A}" type="slidenum">
               <a:rPr lang="de-DE" smtClean="0"/>
               <a:pPr/>
-              <a:t>14</a:t>
+              <a:t>15</a:t>
             </a:fld>
             <a:endParaRPr lang="de-DE"/>
           </a:p>
@@ -10215,7 +10558,7 @@
 </p:sld>
 </file>
 
-<file path=ppt/slides/slide15.xml><?xml version="1.0" encoding="utf-8"?>
+<file path=ppt/slides/slide16.xml><?xml version="1.0" encoding="utf-8"?>
 <p:sld xmlns:a="http://schemas.openxmlformats.org/drawingml/2006/main" xmlns:r="http://schemas.openxmlformats.org/officeDocument/2006/relationships" xmlns:p="http://schemas.openxmlformats.org/presentationml/2006/main">
   <p:cSld>
     <p:spTree>
@@ -10253,10 +10596,10 @@
           <a:bodyPr/>
           <a:lstStyle/>
           <a:p>
-            <a:fld id="{A2E8877F-2015-4290-957C-06EF82A52242}" type="datetime8">
-              <a:rPr lang="en-DE" smtClean="0"/>
-              <a:t>15/12/2022 12:38</a:t>
-            </a:fld>
+            <a:r>
+              <a:rPr lang="LID4096"/>
+              <a:t>12/01/2023</a:t>
+            </a:r>
             <a:endParaRPr lang="de-DE" dirty="0"/>
           </a:p>
         </p:txBody>
@@ -10314,7 +10657,7 @@
             <a:fld id="{D949F9DF-37BD-4CD6-BF49-65BA579E1D7A}" type="slidenum">
               <a:rPr lang="de-DE" smtClean="0"/>
               <a:pPr/>
-              <a:t>15</a:t>
+              <a:t>16</a:t>
             </a:fld>
             <a:endParaRPr lang="de-DE"/>
           </a:p>
@@ -10746,7 +11089,7 @@
 </p:sld>
 </file>
 
-<file path=ppt/slides/slide16.xml><?xml version="1.0" encoding="utf-8"?>
+<file path=ppt/slides/slide17.xml><?xml version="1.0" encoding="utf-8"?>
 <p:sld xmlns:a="http://schemas.openxmlformats.org/drawingml/2006/main" xmlns:r="http://schemas.openxmlformats.org/officeDocument/2006/relationships" xmlns:p="http://schemas.openxmlformats.org/presentationml/2006/main">
   <p:cSld>
     <p:spTree>
@@ -10822,10 +11165,10 @@
           <a:bodyPr/>
           <a:lstStyle/>
           <a:p>
-            <a:fld id="{C683496F-A479-4189-AF7A-49EC797A60BB}" type="datetime8">
-              <a:rPr lang="en-DE" smtClean="0"/>
-              <a:t>15/12/2022 12:38</a:t>
-            </a:fld>
+            <a:r>
+              <a:rPr lang="LID4096"/>
+              <a:t>12/01/2023</a:t>
+            </a:r>
             <a:endParaRPr lang="de-DE" dirty="0"/>
           </a:p>
         </p:txBody>
@@ -10883,7 +11226,7 @@
             <a:fld id="{D949F9DF-37BD-4CD6-BF49-65BA579E1D7A}" type="slidenum">
               <a:rPr lang="de-DE" smtClean="0"/>
               <a:pPr/>
-              <a:t>16</a:t>
+              <a:t>17</a:t>
             </a:fld>
             <a:endParaRPr lang="de-DE"/>
           </a:p>
@@ -10902,7 +11245,7 @@
 </p:sld>
 </file>
 
-<file path=ppt/slides/slide17.xml><?xml version="1.0" encoding="utf-8"?>
+<file path=ppt/slides/slide18.xml><?xml version="1.0" encoding="utf-8"?>
 <p:sld xmlns:a="http://schemas.openxmlformats.org/drawingml/2006/main" xmlns:r="http://schemas.openxmlformats.org/officeDocument/2006/relationships" xmlns:p="http://schemas.openxmlformats.org/presentationml/2006/main">
   <p:cSld>
     <p:spTree>
@@ -10940,10 +11283,10 @@
           <a:bodyPr/>
           <a:lstStyle/>
           <a:p>
-            <a:fld id="{A2E8877F-2015-4290-957C-06EF82A52242}" type="datetime8">
-              <a:rPr lang="en-DE" smtClean="0"/>
-              <a:t>15/12/2022 12:38</a:t>
-            </a:fld>
+            <a:r>
+              <a:rPr lang="LID4096"/>
+              <a:t>12/01/2023</a:t>
+            </a:r>
             <a:endParaRPr lang="de-DE" dirty="0"/>
           </a:p>
         </p:txBody>
@@ -11001,7 +11344,7 @@
             <a:fld id="{D949F9DF-37BD-4CD6-BF49-65BA579E1D7A}" type="slidenum">
               <a:rPr lang="de-DE" smtClean="0"/>
               <a:pPr/>
-              <a:t>17</a:t>
+              <a:t>18</a:t>
             </a:fld>
             <a:endParaRPr lang="de-DE"/>
           </a:p>
@@ -11405,7 +11748,7 @@
 </p:sld>
 </file>
 
-<file path=ppt/slides/slide18.xml><?xml version="1.0" encoding="utf-8"?>
+<file path=ppt/slides/slide19.xml><?xml version="1.0" encoding="utf-8"?>
 <p:sld xmlns:a="http://schemas.openxmlformats.org/drawingml/2006/main" xmlns:r="http://schemas.openxmlformats.org/officeDocument/2006/relationships" xmlns:p="http://schemas.openxmlformats.org/presentationml/2006/main">
   <p:cSld>
     <p:spTree>
@@ -11443,10 +11786,10 @@
           <a:bodyPr/>
           <a:lstStyle/>
           <a:p>
-            <a:fld id="{A2E8877F-2015-4290-957C-06EF82A52242}" type="datetime8">
-              <a:rPr lang="en-DE" smtClean="0"/>
-              <a:t>15/12/2022 12:38</a:t>
-            </a:fld>
+            <a:r>
+              <a:rPr lang="LID4096"/>
+              <a:t>12/01/2023</a:t>
+            </a:r>
             <a:endParaRPr lang="de-DE" dirty="0"/>
           </a:p>
         </p:txBody>
@@ -11504,7 +11847,7 @@
             <a:fld id="{D949F9DF-37BD-4CD6-BF49-65BA579E1D7A}" type="slidenum">
               <a:rPr lang="de-DE" smtClean="0"/>
               <a:pPr/>
-              <a:t>18</a:t>
+              <a:t>19</a:t>
             </a:fld>
             <a:endParaRPr lang="de-DE"/>
           </a:p>
@@ -11877,7 +12220,187 @@
 </p:sld>
 </file>
 
-<file path=ppt/slides/slide19.xml><?xml version="1.0" encoding="utf-8"?>
+<file path=ppt/slides/slide2.xml><?xml version="1.0" encoding="utf-8"?>
+<p:sld xmlns:a="http://schemas.openxmlformats.org/drawingml/2006/main" xmlns:r="http://schemas.openxmlformats.org/officeDocument/2006/relationships" xmlns:p="http://schemas.openxmlformats.org/presentationml/2006/main">
+  <p:cSld>
+    <p:spTree>
+      <p:nvGrpSpPr>
+        <p:cNvPr id="1" name=""/>
+        <p:cNvGrpSpPr/>
+        <p:nvPr/>
+      </p:nvGrpSpPr>
+      <p:grpSpPr>
+        <a:xfrm>
+          <a:off x="0" y="0"/>
+          <a:ext cx="0" cy="0"/>
+          <a:chOff x="0" y="0"/>
+          <a:chExt cx="0" cy="0"/>
+        </a:xfrm>
+      </p:grpSpPr>
+      <p:sp>
+        <p:nvSpPr>
+          <p:cNvPr id="2" name="Datumsplatzhalter 1">
+            <a:extLst>
+              <a:ext uri="{FF2B5EF4-FFF2-40B4-BE49-F238E27FC236}">
+                <a16:creationId xmlns:a16="http://schemas.microsoft.com/office/drawing/2014/main" id="{DA70317D-0F23-D5C4-2C97-6D7F0871509F}"/>
+              </a:ext>
+            </a:extLst>
+          </p:cNvPr>
+          <p:cNvSpPr>
+            <a:spLocks noGrp="1"/>
+          </p:cNvSpPr>
+          <p:nvPr>
+            <p:ph type="dt" sz="half" idx="10"/>
+          </p:nvPr>
+        </p:nvSpPr>
+        <p:spPr/>
+        <p:txBody>
+          <a:bodyPr/>
+          <a:lstStyle/>
+          <a:p>
+            <a:r>
+              <a:rPr lang="LID4096"/>
+              <a:t>12/01/2023</a:t>
+            </a:r>
+            <a:endParaRPr lang="de-DE" dirty="0"/>
+          </a:p>
+        </p:txBody>
+      </p:sp>
+      <p:sp>
+        <p:nvSpPr>
+          <p:cNvPr id="3" name="Fußzeilenplatzhalter 2">
+            <a:extLst>
+              <a:ext uri="{FF2B5EF4-FFF2-40B4-BE49-F238E27FC236}">
+                <a16:creationId xmlns:a16="http://schemas.microsoft.com/office/drawing/2014/main" id="{EE356D28-0B4C-CEA9-A5BB-70C6A8CB8F60}"/>
+              </a:ext>
+            </a:extLst>
+          </p:cNvPr>
+          <p:cNvSpPr>
+            <a:spLocks noGrp="1"/>
+          </p:cNvSpPr>
+          <p:nvPr>
+            <p:ph type="ftr" sz="quarter" idx="11"/>
+          </p:nvPr>
+        </p:nvSpPr>
+        <p:spPr/>
+        <p:txBody>
+          <a:bodyPr/>
+          <a:lstStyle/>
+          <a:p>
+            <a:r>
+              <a:rPr lang="en-US"/>
+              <a:t>Modeling of nonlinear Systems with LSTMs | Sebastian Hirt</a:t>
+            </a:r>
+            <a:endParaRPr lang="de-DE" dirty="0"/>
+          </a:p>
+        </p:txBody>
+      </p:sp>
+      <p:sp>
+        <p:nvSpPr>
+          <p:cNvPr id="4" name="Foliennummernplatzhalter 3">
+            <a:extLst>
+              <a:ext uri="{FF2B5EF4-FFF2-40B4-BE49-F238E27FC236}">
+                <a16:creationId xmlns:a16="http://schemas.microsoft.com/office/drawing/2014/main" id="{5D2B4545-7DC3-302B-B5BA-B1AFF8A67971}"/>
+              </a:ext>
+            </a:extLst>
+          </p:cNvPr>
+          <p:cNvSpPr>
+            <a:spLocks noGrp="1"/>
+          </p:cNvSpPr>
+          <p:nvPr>
+            <p:ph type="sldNum" sz="quarter" idx="12"/>
+          </p:nvPr>
+        </p:nvSpPr>
+        <p:spPr/>
+        <p:txBody>
+          <a:bodyPr/>
+          <a:lstStyle/>
+          <a:p>
+            <a:fld id="{D949F9DF-37BD-4CD6-BF49-65BA579E1D7A}" type="slidenum">
+              <a:rPr lang="de-DE" smtClean="0"/>
+              <a:pPr/>
+              <a:t>2</a:t>
+            </a:fld>
+            <a:endParaRPr lang="de-DE"/>
+          </a:p>
+        </p:txBody>
+      </p:sp>
+      <p:sp>
+        <p:nvSpPr>
+          <p:cNvPr id="5" name="Titel 4">
+            <a:extLst>
+              <a:ext uri="{FF2B5EF4-FFF2-40B4-BE49-F238E27FC236}">
+                <a16:creationId xmlns:a16="http://schemas.microsoft.com/office/drawing/2014/main" id="{38CF73E8-E1FA-9775-4421-83829CA8646F}"/>
+              </a:ext>
+            </a:extLst>
+          </p:cNvPr>
+          <p:cNvSpPr>
+            <a:spLocks noGrp="1"/>
+          </p:cNvSpPr>
+          <p:nvPr>
+            <p:ph type="title"/>
+          </p:nvPr>
+        </p:nvSpPr>
+        <p:spPr/>
+        <p:txBody>
+          <a:bodyPr/>
+          <a:lstStyle/>
+          <a:p>
+            <a:r>
+              <a:rPr lang="en-US" dirty="0"/>
+              <a:t>Motivation</a:t>
+            </a:r>
+          </a:p>
+        </p:txBody>
+      </p:sp>
+      <p:sp>
+        <p:nvSpPr>
+          <p:cNvPr id="6" name="Textplatzhalter 5">
+            <a:extLst>
+              <a:ext uri="{FF2B5EF4-FFF2-40B4-BE49-F238E27FC236}">
+                <a16:creationId xmlns:a16="http://schemas.microsoft.com/office/drawing/2014/main" id="{A30F372C-3EE1-F0C8-AD13-5E374845FE57}"/>
+              </a:ext>
+            </a:extLst>
+          </p:cNvPr>
+          <p:cNvSpPr>
+            <a:spLocks noGrp="1"/>
+          </p:cNvSpPr>
+          <p:nvPr>
+            <p:ph type="body" sz="quarter" idx="17"/>
+          </p:nvPr>
+        </p:nvSpPr>
+        <p:spPr/>
+        <p:txBody>
+          <a:bodyPr/>
+          <a:lstStyle/>
+          <a:p>
+            <a:r>
+              <a:rPr lang="en-US" dirty="0"/>
+              <a:t>Just plot of timeseries</a:t>
+            </a:r>
+          </a:p>
+          <a:p>
+            <a:r>
+              <a:rPr lang="en-US" dirty="0"/>
+              <a:t>Image of systems, gears, pendulum?</a:t>
+            </a:r>
+          </a:p>
+        </p:txBody>
+      </p:sp>
+    </p:spTree>
+    <p:extLst>
+      <p:ext uri="{BB962C8B-B14F-4D97-AF65-F5344CB8AC3E}">
+        <p14:creationId xmlns:p14="http://schemas.microsoft.com/office/powerpoint/2010/main" val="1557798522"/>
+      </p:ext>
+    </p:extLst>
+  </p:cSld>
+  <p:clrMapOvr>
+    <a:masterClrMapping/>
+  </p:clrMapOvr>
+</p:sld>
+</file>
+
+<file path=ppt/slides/slide20.xml><?xml version="1.0" encoding="utf-8"?>
 <p:sld xmlns:a="http://schemas.openxmlformats.org/drawingml/2006/main" xmlns:r="http://schemas.openxmlformats.org/officeDocument/2006/relationships" xmlns:p="http://schemas.openxmlformats.org/presentationml/2006/main">
   <p:cSld>
     <p:spTree>
@@ -11915,10 +12438,10 @@
           <a:bodyPr/>
           <a:lstStyle/>
           <a:p>
-            <a:fld id="{A2E8877F-2015-4290-957C-06EF82A52242}" type="datetime8">
-              <a:rPr lang="en-DE" smtClean="0"/>
-              <a:t>15/12/2022 12:38</a:t>
-            </a:fld>
+            <a:r>
+              <a:rPr lang="LID4096"/>
+              <a:t>12/01/2023</a:t>
+            </a:r>
             <a:endParaRPr lang="de-DE" dirty="0"/>
           </a:p>
         </p:txBody>
@@ -11976,7 +12499,7 @@
             <a:fld id="{D949F9DF-37BD-4CD6-BF49-65BA579E1D7A}" type="slidenum">
               <a:rPr lang="de-DE" smtClean="0"/>
               <a:pPr/>
-              <a:t>19</a:t>
+              <a:t>20</a:t>
             </a:fld>
             <a:endParaRPr lang="de-DE"/>
           </a:p>
@@ -12349,159 +12872,7 @@
 </p:sld>
 </file>
 
-<file path=ppt/slides/slide2.xml><?xml version="1.0" encoding="utf-8"?>
-<p:sld xmlns:a="http://schemas.openxmlformats.org/drawingml/2006/main" xmlns:r="http://schemas.openxmlformats.org/officeDocument/2006/relationships" xmlns:p="http://schemas.openxmlformats.org/presentationml/2006/main">
-  <p:cSld>
-    <p:spTree>
-      <p:nvGrpSpPr>
-        <p:cNvPr id="1" name=""/>
-        <p:cNvGrpSpPr/>
-        <p:nvPr/>
-      </p:nvGrpSpPr>
-      <p:grpSpPr>
-        <a:xfrm>
-          <a:off x="0" y="0"/>
-          <a:ext cx="0" cy="0"/>
-          <a:chOff x="0" y="0"/>
-          <a:chExt cx="0" cy="0"/>
-        </a:xfrm>
-      </p:grpSpPr>
-      <p:sp>
-        <p:nvSpPr>
-          <p:cNvPr id="21" name="Titel 20">
-            <a:extLst>
-              <a:ext uri="{FF2B5EF4-FFF2-40B4-BE49-F238E27FC236}">
-                <a16:creationId xmlns:a16="http://schemas.microsoft.com/office/drawing/2014/main" id="{3018BD05-96D8-43F2-A6AA-CC40E7C32CCE}"/>
-              </a:ext>
-            </a:extLst>
-          </p:cNvPr>
-          <p:cNvSpPr>
-            <a:spLocks noGrp="1"/>
-          </p:cNvSpPr>
-          <p:nvPr>
-            <p:ph type="title"/>
-          </p:nvPr>
-        </p:nvSpPr>
-        <p:spPr>
-          <a:xfrm>
-            <a:off x="518318" y="3152001"/>
-            <a:ext cx="11157743" cy="553998"/>
-          </a:xfrm>
-        </p:spPr>
-        <p:txBody>
-          <a:bodyPr/>
-          <a:lstStyle/>
-          <a:p>
-            <a:r>
-              <a:rPr lang="de-DE" dirty="0" err="1"/>
-              <a:t>Introduction</a:t>
-            </a:r>
-            <a:endParaRPr lang="de-DE" dirty="0"/>
-          </a:p>
-        </p:txBody>
-      </p:sp>
-      <p:sp>
-        <p:nvSpPr>
-          <p:cNvPr id="2" name="Datumsplatzhalter 1">
-            <a:extLst>
-              <a:ext uri="{FF2B5EF4-FFF2-40B4-BE49-F238E27FC236}">
-                <a16:creationId xmlns:a16="http://schemas.microsoft.com/office/drawing/2014/main" id="{FE7214E1-5D14-4D0B-BADD-2E239FECEC10}"/>
-              </a:ext>
-            </a:extLst>
-          </p:cNvPr>
-          <p:cNvSpPr>
-            <a:spLocks noGrp="1"/>
-          </p:cNvSpPr>
-          <p:nvPr>
-            <p:ph type="dt" sz="half" idx="10"/>
-          </p:nvPr>
-        </p:nvSpPr>
-        <p:spPr/>
-        <p:txBody>
-          <a:bodyPr/>
-          <a:lstStyle/>
-          <a:p>
-            <a:fld id="{C683496F-A479-4189-AF7A-49EC797A60BB}" type="datetime8">
-              <a:rPr lang="en-DE" smtClean="0"/>
-              <a:t>15/12/2022 12:38</a:t>
-            </a:fld>
-            <a:endParaRPr lang="de-DE" dirty="0"/>
-          </a:p>
-        </p:txBody>
-      </p:sp>
-      <p:sp>
-        <p:nvSpPr>
-          <p:cNvPr id="3" name="Fußzeilenplatzhalter 2">
-            <a:extLst>
-              <a:ext uri="{FF2B5EF4-FFF2-40B4-BE49-F238E27FC236}">
-                <a16:creationId xmlns:a16="http://schemas.microsoft.com/office/drawing/2014/main" id="{6A6AD034-0F65-47AF-9CAA-C4B0CEB30D4D}"/>
-              </a:ext>
-            </a:extLst>
-          </p:cNvPr>
-          <p:cNvSpPr>
-            <a:spLocks noGrp="1"/>
-          </p:cNvSpPr>
-          <p:nvPr>
-            <p:ph type="ftr" sz="quarter" idx="11"/>
-          </p:nvPr>
-        </p:nvSpPr>
-        <p:spPr/>
-        <p:txBody>
-          <a:bodyPr/>
-          <a:lstStyle/>
-          <a:p>
-            <a:r>
-              <a:rPr lang="en-US"/>
-              <a:t>Modeling of nonlinear Systems with LSTMs | Sebastian Hirt</a:t>
-            </a:r>
-            <a:endParaRPr lang="de-DE" dirty="0"/>
-          </a:p>
-        </p:txBody>
-      </p:sp>
-      <p:sp>
-        <p:nvSpPr>
-          <p:cNvPr id="4" name="Foliennummernplatzhalter 3">
-            <a:extLst>
-              <a:ext uri="{FF2B5EF4-FFF2-40B4-BE49-F238E27FC236}">
-                <a16:creationId xmlns:a16="http://schemas.microsoft.com/office/drawing/2014/main" id="{00F7E098-F740-40F7-A085-7034627D9148}"/>
-              </a:ext>
-            </a:extLst>
-          </p:cNvPr>
-          <p:cNvSpPr>
-            <a:spLocks noGrp="1"/>
-          </p:cNvSpPr>
-          <p:nvPr>
-            <p:ph type="sldNum" sz="quarter" idx="12"/>
-          </p:nvPr>
-        </p:nvSpPr>
-        <p:spPr/>
-        <p:txBody>
-          <a:bodyPr/>
-          <a:lstStyle/>
-          <a:p>
-            <a:fld id="{D949F9DF-37BD-4CD6-BF49-65BA579E1D7A}" type="slidenum">
-              <a:rPr lang="de-DE" smtClean="0"/>
-              <a:pPr/>
-              <a:t>2</a:t>
-            </a:fld>
-            <a:endParaRPr lang="de-DE"/>
-          </a:p>
-        </p:txBody>
-      </p:sp>
-    </p:spTree>
-    <p:extLst>
-      <p:ext uri="{BB962C8B-B14F-4D97-AF65-F5344CB8AC3E}">
-        <p14:creationId xmlns:p14="http://schemas.microsoft.com/office/powerpoint/2010/main" val="1433872768"/>
-      </p:ext>
-    </p:extLst>
-  </p:cSld>
-  <p:clrMapOvr>
-    <a:masterClrMapping/>
-  </p:clrMapOvr>
-</p:sld>
-</file>
-
-<file path=ppt/slides/slide20.xml><?xml version="1.0" encoding="utf-8"?>
+<file path=ppt/slides/slide21.xml><?xml version="1.0" encoding="utf-8"?>
 <p:sld xmlns:a="http://schemas.openxmlformats.org/drawingml/2006/main" xmlns:r="http://schemas.openxmlformats.org/officeDocument/2006/relationships" xmlns:p="http://schemas.openxmlformats.org/presentationml/2006/main">
   <p:cSld>
     <p:spTree>
@@ -12539,10 +12910,10 @@
           <a:bodyPr/>
           <a:lstStyle/>
           <a:p>
-            <a:fld id="{A2E8877F-2015-4290-957C-06EF82A52242}" type="datetime8">
-              <a:rPr lang="en-DE" smtClean="0"/>
-              <a:t>15/12/2022 12:38</a:t>
-            </a:fld>
+            <a:r>
+              <a:rPr lang="LID4096"/>
+              <a:t>12/01/2023</a:t>
+            </a:r>
             <a:endParaRPr lang="de-DE" dirty="0"/>
           </a:p>
         </p:txBody>
@@ -12600,7 +12971,7 @@
             <a:fld id="{D949F9DF-37BD-4CD6-BF49-65BA579E1D7A}" type="slidenum">
               <a:rPr lang="de-DE" smtClean="0"/>
               <a:pPr/>
-              <a:t>20</a:t>
+              <a:t>21</a:t>
             </a:fld>
             <a:endParaRPr lang="de-DE"/>
           </a:p>
@@ -12973,7 +13344,7 @@
 </p:sld>
 </file>
 
-<file path=ppt/slides/slide21.xml><?xml version="1.0" encoding="utf-8"?>
+<file path=ppt/slides/slide22.xml><?xml version="1.0" encoding="utf-8"?>
 <p:sld xmlns:a="http://schemas.openxmlformats.org/drawingml/2006/main" xmlns:r="http://schemas.openxmlformats.org/officeDocument/2006/relationships" xmlns:p="http://schemas.openxmlformats.org/presentationml/2006/main">
   <p:cSld>
     <p:spTree>
@@ -13011,10 +13382,10 @@
           <a:bodyPr/>
           <a:lstStyle/>
           <a:p>
-            <a:fld id="{A2E8877F-2015-4290-957C-06EF82A52242}" type="datetime8">
-              <a:rPr lang="en-DE" smtClean="0"/>
-              <a:t>15/12/2022 12:38</a:t>
-            </a:fld>
+            <a:r>
+              <a:rPr lang="LID4096"/>
+              <a:t>12/01/2023</a:t>
+            </a:r>
             <a:endParaRPr lang="de-DE" dirty="0"/>
           </a:p>
         </p:txBody>
@@ -13072,7 +13443,7 @@
             <a:fld id="{D949F9DF-37BD-4CD6-BF49-65BA579E1D7A}" type="slidenum">
               <a:rPr lang="de-DE" smtClean="0"/>
               <a:pPr/>
-              <a:t>21</a:t>
+              <a:t>22</a:t>
             </a:fld>
             <a:endParaRPr lang="de-DE"/>
           </a:p>
@@ -13445,7 +13816,7 @@
 </p:sld>
 </file>
 
-<file path=ppt/slides/slide22.xml><?xml version="1.0" encoding="utf-8"?>
+<file path=ppt/slides/slide23.xml><?xml version="1.0" encoding="utf-8"?>
 <p:sld xmlns:a="http://schemas.openxmlformats.org/drawingml/2006/main" xmlns:r="http://schemas.openxmlformats.org/officeDocument/2006/relationships" xmlns:p="http://schemas.openxmlformats.org/presentationml/2006/main">
   <p:cSld>
     <p:spTree>
@@ -13516,10 +13887,10 @@
           <a:bodyPr/>
           <a:lstStyle/>
           <a:p>
-            <a:fld id="{C683496F-A479-4189-AF7A-49EC797A60BB}" type="datetime8">
-              <a:rPr lang="en-DE" smtClean="0"/>
-              <a:t>15/12/2022 12:38</a:t>
-            </a:fld>
+            <a:r>
+              <a:rPr lang="LID4096"/>
+              <a:t>12/01/2023</a:t>
+            </a:r>
             <a:endParaRPr lang="de-DE" dirty="0"/>
           </a:p>
         </p:txBody>
@@ -13577,7 +13948,7 @@
             <a:fld id="{D949F9DF-37BD-4CD6-BF49-65BA579E1D7A}" type="slidenum">
               <a:rPr lang="de-DE" smtClean="0"/>
               <a:pPr/>
-              <a:t>22</a:t>
+              <a:t>23</a:t>
             </a:fld>
             <a:endParaRPr lang="de-DE"/>
           </a:p>
@@ -13596,7 +13967,7 @@
 </p:sld>
 </file>
 
-<file path=ppt/slides/slide23.xml><?xml version="1.0" encoding="utf-8"?>
+<file path=ppt/slides/slide24.xml><?xml version="1.0" encoding="utf-8"?>
 <p:sld xmlns:a="http://schemas.openxmlformats.org/drawingml/2006/main" xmlns:r="http://schemas.openxmlformats.org/officeDocument/2006/relationships" xmlns:p="http://schemas.openxmlformats.org/presentationml/2006/main">
   <p:cSld>
     <p:spTree>
@@ -13634,10 +14005,10 @@
           <a:bodyPr/>
           <a:lstStyle/>
           <a:p>
-            <a:fld id="{A2E8877F-2015-4290-957C-06EF82A52242}" type="datetime8">
-              <a:rPr lang="en-DE" smtClean="0"/>
-              <a:t>15/12/2022 12:38</a:t>
-            </a:fld>
+            <a:r>
+              <a:rPr lang="LID4096"/>
+              <a:t>12/01/2023</a:t>
+            </a:r>
             <a:endParaRPr lang="de-DE" dirty="0"/>
           </a:p>
         </p:txBody>
@@ -13695,7 +14066,7 @@
             <a:fld id="{D949F9DF-37BD-4CD6-BF49-65BA579E1D7A}" type="slidenum">
               <a:rPr lang="de-DE" smtClean="0"/>
               <a:pPr/>
-              <a:t>23</a:t>
+              <a:t>24</a:t>
             </a:fld>
             <a:endParaRPr lang="de-DE"/>
           </a:p>
@@ -13816,7 +14187,7 @@
 </p:sld>
 </file>
 
-<file path=ppt/slides/slide24.xml><?xml version="1.0" encoding="utf-8"?>
+<file path=ppt/slides/slide25.xml><?xml version="1.0" encoding="utf-8"?>
 <p:sld xmlns:a="http://schemas.openxmlformats.org/drawingml/2006/main" xmlns:r="http://schemas.openxmlformats.org/officeDocument/2006/relationships" xmlns:p="http://schemas.openxmlformats.org/presentationml/2006/main">
   <p:cSld>
     <p:spTree>
@@ -13854,10 +14225,10 @@
           <a:bodyPr/>
           <a:lstStyle/>
           <a:p>
-            <a:fld id="{A2E8877F-2015-4290-957C-06EF82A52242}" type="datetime8">
-              <a:rPr lang="en-DE" smtClean="0"/>
-              <a:t>15/12/2022 12:38</a:t>
-            </a:fld>
+            <a:r>
+              <a:rPr lang="LID4096"/>
+              <a:t>12/01/2023</a:t>
+            </a:r>
             <a:endParaRPr lang="de-DE" dirty="0"/>
           </a:p>
         </p:txBody>
@@ -13915,7 +14286,7 @@
             <a:fld id="{D949F9DF-37BD-4CD6-BF49-65BA579E1D7A}" type="slidenum">
               <a:rPr lang="de-DE" smtClean="0"/>
               <a:pPr/>
-              <a:t>24</a:t>
+              <a:t>25</a:t>
             </a:fld>
             <a:endParaRPr lang="de-DE"/>
           </a:p>
@@ -14036,7 +14407,7 @@
 </p:sld>
 </file>
 
-<file path=ppt/slides/slide25.xml><?xml version="1.0" encoding="utf-8"?>
+<file path=ppt/slides/slide26.xml><?xml version="1.0" encoding="utf-8"?>
 <p:sld xmlns:a="http://schemas.openxmlformats.org/drawingml/2006/main" xmlns:r="http://schemas.openxmlformats.org/officeDocument/2006/relationships" xmlns:p="http://schemas.openxmlformats.org/presentationml/2006/main">
   <p:cSld>
     <p:spTree>
@@ -14074,10 +14445,10 @@
           <a:bodyPr/>
           <a:lstStyle/>
           <a:p>
-            <a:fld id="{A2E8877F-2015-4290-957C-06EF82A52242}" type="datetime8">
-              <a:rPr lang="en-DE" smtClean="0"/>
-              <a:t>15/12/2022 12:38</a:t>
-            </a:fld>
+            <a:r>
+              <a:rPr lang="LID4096"/>
+              <a:t>12/01/2023</a:t>
+            </a:r>
             <a:endParaRPr lang="de-DE" dirty="0"/>
           </a:p>
         </p:txBody>
@@ -14135,7 +14506,7 @@
             <a:fld id="{D949F9DF-37BD-4CD6-BF49-65BA579E1D7A}" type="slidenum">
               <a:rPr lang="de-DE" smtClean="0"/>
               <a:pPr/>
-              <a:t>25</a:t>
+              <a:t>26</a:t>
             </a:fld>
             <a:endParaRPr lang="de-DE"/>
           </a:p>
@@ -14256,7 +14627,7 @@
 </p:sld>
 </file>
 
-<file path=ppt/slides/slide26.xml><?xml version="1.0" encoding="utf-8"?>
+<file path=ppt/slides/slide27.xml><?xml version="1.0" encoding="utf-8"?>
 <p:sld xmlns:a="http://schemas.openxmlformats.org/drawingml/2006/main" xmlns:r="http://schemas.openxmlformats.org/officeDocument/2006/relationships" xmlns:p="http://schemas.openxmlformats.org/presentationml/2006/main">
   <p:cSld>
     <p:spTree>
@@ -14294,10 +14665,10 @@
           <a:bodyPr/>
           <a:lstStyle/>
           <a:p>
-            <a:fld id="{A2E8877F-2015-4290-957C-06EF82A52242}" type="datetime8">
-              <a:rPr lang="en-DE" smtClean="0"/>
-              <a:t>15/12/2022 12:38</a:t>
-            </a:fld>
+            <a:r>
+              <a:rPr lang="LID4096"/>
+              <a:t>12/01/2023</a:t>
+            </a:r>
             <a:endParaRPr lang="de-DE" dirty="0"/>
           </a:p>
         </p:txBody>
@@ -14355,7 +14726,7 @@
             <a:fld id="{D949F9DF-37BD-4CD6-BF49-65BA579E1D7A}" type="slidenum">
               <a:rPr lang="de-DE" smtClean="0"/>
               <a:pPr/>
-              <a:t>26</a:t>
+              <a:t>27</a:t>
             </a:fld>
             <a:endParaRPr lang="de-DE"/>
           </a:p>
@@ -14463,245 +14834,46 @@
           </a:prstGeom>
         </p:spPr>
       </p:pic>
+      <p:pic>
+        <p:nvPicPr>
+          <p:cNvPr id="10" name="Grafik 9">
+            <a:extLst>
+              <a:ext uri="{FF2B5EF4-FFF2-40B4-BE49-F238E27FC236}">
+                <a16:creationId xmlns:a16="http://schemas.microsoft.com/office/drawing/2014/main" id="{2A4BB932-02D1-D922-3865-4CA07B626BD7}"/>
+              </a:ext>
+            </a:extLst>
+          </p:cNvPr>
+          <p:cNvPicPr>
+            <a:picLocks noChangeAspect="1"/>
+          </p:cNvPicPr>
+          <p:nvPr/>
+        </p:nvPicPr>
+        <p:blipFill>
+          <a:blip r:embed="rId3">
+            <a:extLst>
+              <a:ext uri="{28A0092B-C50C-407E-A947-70E740481C1C}">
+                <a14:useLocalDpi xmlns:a14="http://schemas.microsoft.com/office/drawing/2010/main" val="0"/>
+              </a:ext>
+            </a:extLst>
+          </a:blip>
+          <a:stretch>
+            <a:fillRect/>
+          </a:stretch>
+        </p:blipFill>
+        <p:spPr>
+          <a:xfrm>
+            <a:off x="3169914" y="1234435"/>
+            <a:ext cx="5852172" cy="4389129"/>
+          </a:xfrm>
+          <a:prstGeom prst="rect">
+            <a:avLst/>
+          </a:prstGeom>
+        </p:spPr>
+      </p:pic>
     </p:spTree>
     <p:extLst>
       <p:ext uri="{BB962C8B-B14F-4D97-AF65-F5344CB8AC3E}">
         <p14:creationId xmlns:p14="http://schemas.microsoft.com/office/powerpoint/2010/main" val="1512079235"/>
-      </p:ext>
-    </p:extLst>
-  </p:cSld>
-  <p:clrMapOvr>
-    <a:masterClrMapping/>
-  </p:clrMapOvr>
-</p:sld>
-</file>
-
-<file path=ppt/slides/slide27.xml><?xml version="1.0" encoding="utf-8"?>
-<p:sld xmlns:a="http://schemas.openxmlformats.org/drawingml/2006/main" xmlns:r="http://schemas.openxmlformats.org/officeDocument/2006/relationships" xmlns:p="http://schemas.openxmlformats.org/presentationml/2006/main">
-  <p:cSld>
-    <p:spTree>
-      <p:nvGrpSpPr>
-        <p:cNvPr id="1" name=""/>
-        <p:cNvGrpSpPr/>
-        <p:nvPr/>
-      </p:nvGrpSpPr>
-      <p:grpSpPr>
-        <a:xfrm>
-          <a:off x="0" y="0"/>
-          <a:ext cx="0" cy="0"/>
-          <a:chOff x="0" y="0"/>
-          <a:chExt cx="0" cy="0"/>
-        </a:xfrm>
-      </p:grpSpPr>
-      <p:sp>
-        <p:nvSpPr>
-          <p:cNvPr id="2" name="Date Placeholder 1">
-            <a:extLst>
-              <a:ext uri="{FF2B5EF4-FFF2-40B4-BE49-F238E27FC236}">
-                <a16:creationId xmlns:a16="http://schemas.microsoft.com/office/drawing/2014/main" id="{2B8CAAFC-F0E6-F31E-198A-AA24CC49C316}"/>
-              </a:ext>
-            </a:extLst>
-          </p:cNvPr>
-          <p:cNvSpPr>
-            <a:spLocks noGrp="1"/>
-          </p:cNvSpPr>
-          <p:nvPr>
-            <p:ph type="dt" sz="half" idx="10"/>
-          </p:nvPr>
-        </p:nvSpPr>
-        <p:spPr/>
-        <p:txBody>
-          <a:bodyPr/>
-          <a:lstStyle/>
-          <a:p>
-            <a:fld id="{A2E8877F-2015-4290-957C-06EF82A52242}" type="datetime8">
-              <a:rPr lang="en-DE" smtClean="0"/>
-              <a:t>15/12/2022 12:38</a:t>
-            </a:fld>
-            <a:endParaRPr lang="de-DE" dirty="0"/>
-          </a:p>
-        </p:txBody>
-      </p:sp>
-      <p:sp>
-        <p:nvSpPr>
-          <p:cNvPr id="3" name="Footer Placeholder 2">
-            <a:extLst>
-              <a:ext uri="{FF2B5EF4-FFF2-40B4-BE49-F238E27FC236}">
-                <a16:creationId xmlns:a16="http://schemas.microsoft.com/office/drawing/2014/main" id="{C49146C1-0EFA-7410-35A6-1C2B33E3E160}"/>
-              </a:ext>
-            </a:extLst>
-          </p:cNvPr>
-          <p:cNvSpPr>
-            <a:spLocks noGrp="1"/>
-          </p:cNvSpPr>
-          <p:nvPr>
-            <p:ph type="ftr" sz="quarter" idx="11"/>
-          </p:nvPr>
-        </p:nvSpPr>
-        <p:spPr/>
-        <p:txBody>
-          <a:bodyPr/>
-          <a:lstStyle/>
-          <a:p>
-            <a:r>
-              <a:rPr lang="en-US"/>
-              <a:t>Modeling of nonlinear Systems with LSTMs | Sebastian Hirt</a:t>
-            </a:r>
-            <a:endParaRPr lang="de-DE" dirty="0"/>
-          </a:p>
-        </p:txBody>
-      </p:sp>
-      <p:sp>
-        <p:nvSpPr>
-          <p:cNvPr id="4" name="Slide Number Placeholder 3">
-            <a:extLst>
-              <a:ext uri="{FF2B5EF4-FFF2-40B4-BE49-F238E27FC236}">
-                <a16:creationId xmlns:a16="http://schemas.microsoft.com/office/drawing/2014/main" id="{83EEE9A2-09B3-BA3D-B64B-856A8F226637}"/>
-              </a:ext>
-            </a:extLst>
-          </p:cNvPr>
-          <p:cNvSpPr>
-            <a:spLocks noGrp="1"/>
-          </p:cNvSpPr>
-          <p:nvPr>
-            <p:ph type="sldNum" sz="quarter" idx="12"/>
-          </p:nvPr>
-        </p:nvSpPr>
-        <p:spPr/>
-        <p:txBody>
-          <a:bodyPr/>
-          <a:lstStyle/>
-          <a:p>
-            <a:fld id="{D949F9DF-37BD-4CD6-BF49-65BA579E1D7A}" type="slidenum">
-              <a:rPr lang="de-DE" smtClean="0"/>
-              <a:pPr/>
-              <a:t>27</a:t>
-            </a:fld>
-            <a:endParaRPr lang="de-DE"/>
-          </a:p>
-        </p:txBody>
-      </p:sp>
-      <p:sp>
-        <p:nvSpPr>
-          <p:cNvPr id="5" name="Title 4">
-            <a:extLst>
-              <a:ext uri="{FF2B5EF4-FFF2-40B4-BE49-F238E27FC236}">
-                <a16:creationId xmlns:a16="http://schemas.microsoft.com/office/drawing/2014/main" id="{BBB354EA-F495-6050-38E7-B27B0D727096}"/>
-              </a:ext>
-            </a:extLst>
-          </p:cNvPr>
-          <p:cNvSpPr>
-            <a:spLocks noGrp="1"/>
-          </p:cNvSpPr>
-          <p:nvPr>
-            <p:ph type="title"/>
-          </p:nvPr>
-        </p:nvSpPr>
-        <p:spPr/>
-        <p:txBody>
-          <a:bodyPr/>
-          <a:lstStyle/>
-          <a:p>
-            <a:r>
-              <a:rPr lang="en-US" dirty="0"/>
-              <a:t>Conclusion</a:t>
-            </a:r>
-          </a:p>
-        </p:txBody>
-      </p:sp>
-      <p:sp>
-        <p:nvSpPr>
-          <p:cNvPr id="6" name="Text Placeholder 5">
-            <a:extLst>
-              <a:ext uri="{FF2B5EF4-FFF2-40B4-BE49-F238E27FC236}">
-                <a16:creationId xmlns:a16="http://schemas.microsoft.com/office/drawing/2014/main" id="{4761E152-B7EF-00B5-47FF-110705BBE7D4}"/>
-              </a:ext>
-            </a:extLst>
-          </p:cNvPr>
-          <p:cNvSpPr>
-            <a:spLocks noGrp="1"/>
-          </p:cNvSpPr>
-          <p:nvPr>
-            <p:ph type="body" sz="quarter" idx="17"/>
-          </p:nvPr>
-        </p:nvSpPr>
-        <p:spPr/>
-        <p:txBody>
-          <a:bodyPr/>
-          <a:lstStyle/>
-          <a:p>
-            <a:r>
-              <a:rPr lang="en-US" dirty="0"/>
-              <a:t>Difficulties in training for larger model</a:t>
-            </a:r>
-          </a:p>
-          <a:p>
-            <a:r>
-              <a:rPr lang="en-US" dirty="0"/>
-              <a:t>Clear ability to predict nonlinear system</a:t>
-            </a:r>
-          </a:p>
-          <a:p>
-            <a:r>
-              <a:rPr lang="en-US" dirty="0"/>
-              <a:t>Error spikes on input change</a:t>
-            </a:r>
-          </a:p>
-          <a:p>
-            <a:r>
-              <a:rPr lang="en-US" dirty="0"/>
-              <a:t>Recommendation:</a:t>
-            </a:r>
-          </a:p>
-          <a:p>
-            <a:pPr lvl="1"/>
-            <a:r>
-              <a:rPr lang="en-US" dirty="0"/>
-              <a:t>Use 2 LSTM layers with 32/64 nodes and learning rate of 0.01 for similar systems</a:t>
-            </a:r>
-          </a:p>
-          <a:p>
-            <a:pPr lvl="1"/>
-            <a:r>
-              <a:rPr lang="en-US" dirty="0"/>
-              <a:t>New hyperparameter search for different systems</a:t>
-            </a:r>
-          </a:p>
-          <a:p>
-            <a:pPr lvl="1"/>
-            <a:endParaRPr lang="en-US" dirty="0"/>
-          </a:p>
-          <a:p>
-            <a:endParaRPr lang="en-US" dirty="0"/>
-          </a:p>
-          <a:p>
-            <a:endParaRPr lang="en-US" sz="1800" dirty="0">
-              <a:effectLst/>
-              <a:latin typeface="Calibri" panose="020F0502020204030204" pitchFamily="34" charset="0"/>
-              <a:ea typeface="Calibri" panose="020F0502020204030204" pitchFamily="34" charset="0"/>
-              <a:cs typeface="Arial" panose="020B0604020202020204" pitchFamily="34" charset="0"/>
-            </a:endParaRPr>
-          </a:p>
-          <a:p>
-            <a:endParaRPr lang="en-US" sz="1800" dirty="0">
-              <a:effectLst/>
-              <a:latin typeface="Calibri" panose="020F0502020204030204" pitchFamily="34" charset="0"/>
-              <a:ea typeface="Calibri" panose="020F0502020204030204" pitchFamily="34" charset="0"/>
-              <a:cs typeface="Arial" panose="020B0604020202020204" pitchFamily="34" charset="0"/>
-            </a:endParaRPr>
-          </a:p>
-          <a:p>
-            <a:endParaRPr lang="en-US" dirty="0"/>
-          </a:p>
-          <a:p>
-            <a:endParaRPr lang="en-US" dirty="0"/>
-          </a:p>
-        </p:txBody>
-      </p:sp>
-    </p:spTree>
-    <p:extLst>
-      <p:ext uri="{BB962C8B-B14F-4D97-AF65-F5344CB8AC3E}">
-        <p14:creationId xmlns:p14="http://schemas.microsoft.com/office/powerpoint/2010/main" val="3217722209"/>
       </p:ext>
     </p:extLst>
   </p:cSld>
@@ -14749,10 +14921,10 @@
           <a:bodyPr/>
           <a:lstStyle/>
           <a:p>
-            <a:fld id="{A2E8877F-2015-4290-957C-06EF82A52242}" type="datetime8">
-              <a:rPr lang="en-DE" smtClean="0"/>
-              <a:t>15/12/2022 12:38</a:t>
-            </a:fld>
+            <a:r>
+              <a:rPr lang="LID4096"/>
+              <a:t>12/01/2023</a:t>
+            </a:r>
             <a:endParaRPr lang="de-DE" dirty="0"/>
           </a:p>
         </p:txBody>
@@ -14839,7 +15011,7 @@
           <a:p>
             <a:r>
               <a:rPr lang="en-US" dirty="0"/>
-              <a:t>Future work</a:t>
+              <a:t>Conclusion and Future Work</a:t>
             </a:r>
           </a:p>
         </p:txBody>
@@ -14867,7 +15039,39 @@
           <a:p>
             <a:r>
               <a:rPr lang="en-US" dirty="0"/>
-              <a:t>Create better dataset to test specific situations</a:t>
+              <a:t>Difficulties in training for larger model</a:t>
+            </a:r>
+          </a:p>
+          <a:p>
+            <a:r>
+              <a:rPr lang="en-US" dirty="0"/>
+              <a:t>Clear ability to predict nonlinear system</a:t>
+            </a:r>
+          </a:p>
+          <a:p>
+            <a:r>
+              <a:rPr lang="en-US" dirty="0"/>
+              <a:t>Error spikes on input change</a:t>
+            </a:r>
+          </a:p>
+          <a:p>
+            <a:r>
+              <a:rPr lang="en-US" dirty="0"/>
+              <a:t>Recommendation:</a:t>
+            </a:r>
+          </a:p>
+          <a:p>
+            <a:pPr lvl="1"/>
+            <a:r>
+              <a:rPr lang="en-US" dirty="0"/>
+              <a:t>Use 2 LSTM layers with 32/64 nodes and learning rate of 0.01 for similar systems</a:t>
+            </a:r>
+          </a:p>
+          <a:p>
+            <a:pPr lvl="1"/>
+            <a:r>
+              <a:rPr lang="en-US" dirty="0"/>
+              <a:t>New hyperparameter search for different systems</a:t>
             </a:r>
           </a:p>
           <a:p>
@@ -14887,10 +15091,6 @@
               <a:rPr lang="en-US" dirty="0"/>
               <a:t>Deeper look into training instabilities necessary for larger models</a:t>
             </a:r>
-          </a:p>
-          <a:p>
-            <a:pPr lvl="1"/>
-            <a:endParaRPr lang="en-US" dirty="0"/>
           </a:p>
           <a:p>
             <a:endParaRPr lang="en-US" dirty="0"/>
@@ -14922,7 +15122,7 @@
     </p:spTree>
     <p:extLst>
       <p:ext uri="{BB962C8B-B14F-4D97-AF65-F5344CB8AC3E}">
-        <p14:creationId xmlns:p14="http://schemas.microsoft.com/office/powerpoint/2010/main" val="3493796150"/>
+        <p14:creationId xmlns:p14="http://schemas.microsoft.com/office/powerpoint/2010/main" val="3217722209"/>
       </p:ext>
     </p:extLst>
   </p:cSld>
@@ -14976,8 +15176,20 @@
           <a:lstStyle/>
           <a:p>
             <a:r>
+              <a:rPr lang="de-DE" dirty="0" err="1"/>
+              <a:t>Thank</a:t>
+            </a:r>
+            <a:r>
               <a:rPr lang="de-DE" dirty="0"/>
-              <a:t>Vielen Dank!</a:t>
+              <a:t> </a:t>
+            </a:r>
+            <a:r>
+              <a:rPr lang="de-DE" dirty="0" err="1"/>
+              <a:t>You</a:t>
+            </a:r>
+            <a:r>
+              <a:rPr lang="de-DE" dirty="0"/>
+              <a:t>!</a:t>
             </a:r>
           </a:p>
         </p:txBody>
@@ -15014,10 +15226,44 @@
       </p:grpSpPr>
       <p:sp>
         <p:nvSpPr>
-          <p:cNvPr id="2" name="Date Placeholder 1">
-            <a:extLst>
-              <a:ext uri="{FF2B5EF4-FFF2-40B4-BE49-F238E27FC236}">
-                <a16:creationId xmlns:a16="http://schemas.microsoft.com/office/drawing/2014/main" id="{2B8CAAFC-F0E6-F31E-198A-AA24CC49C316}"/>
+          <p:cNvPr id="21" name="Titel 20">
+            <a:extLst>
+              <a:ext uri="{FF2B5EF4-FFF2-40B4-BE49-F238E27FC236}">
+                <a16:creationId xmlns:a16="http://schemas.microsoft.com/office/drawing/2014/main" id="{3018BD05-96D8-43F2-A6AA-CC40E7C32CCE}"/>
+              </a:ext>
+            </a:extLst>
+          </p:cNvPr>
+          <p:cNvSpPr>
+            <a:spLocks noGrp="1"/>
+          </p:cNvSpPr>
+          <p:nvPr>
+            <p:ph type="title"/>
+          </p:nvPr>
+        </p:nvSpPr>
+        <p:spPr>
+          <a:xfrm>
+            <a:off x="518318" y="3152001"/>
+            <a:ext cx="11157743" cy="553998"/>
+          </a:xfrm>
+        </p:spPr>
+        <p:txBody>
+          <a:bodyPr/>
+          <a:lstStyle/>
+          <a:p>
+            <a:r>
+              <a:rPr lang="de-DE" dirty="0" err="1"/>
+              <a:t>Introduction</a:t>
+            </a:r>
+            <a:endParaRPr lang="de-DE" dirty="0"/>
+          </a:p>
+        </p:txBody>
+      </p:sp>
+      <p:sp>
+        <p:nvSpPr>
+          <p:cNvPr id="2" name="Datumsplatzhalter 1">
+            <a:extLst>
+              <a:ext uri="{FF2B5EF4-FFF2-40B4-BE49-F238E27FC236}">
+                <a16:creationId xmlns:a16="http://schemas.microsoft.com/office/drawing/2014/main" id="{FE7214E1-5D14-4D0B-BADD-2E239FECEC10}"/>
               </a:ext>
             </a:extLst>
           </p:cNvPr>
@@ -15033,20 +15279,20 @@
           <a:bodyPr/>
           <a:lstStyle/>
           <a:p>
-            <a:fld id="{A2E8877F-2015-4290-957C-06EF82A52242}" type="datetime8">
-              <a:rPr lang="en-DE" smtClean="0"/>
-              <a:t>15/12/2022 12:38</a:t>
-            </a:fld>
+            <a:r>
+              <a:rPr lang="LID4096" dirty="0"/>
+              <a:t>12/01/2023</a:t>
+            </a:r>
             <a:endParaRPr lang="de-DE" dirty="0"/>
           </a:p>
         </p:txBody>
       </p:sp>
       <p:sp>
         <p:nvSpPr>
-          <p:cNvPr id="3" name="Footer Placeholder 2">
-            <a:extLst>
-              <a:ext uri="{FF2B5EF4-FFF2-40B4-BE49-F238E27FC236}">
-                <a16:creationId xmlns:a16="http://schemas.microsoft.com/office/drawing/2014/main" id="{C49146C1-0EFA-7410-35A6-1C2B33E3E160}"/>
+          <p:cNvPr id="3" name="Fußzeilenplatzhalter 2">
+            <a:extLst>
+              <a:ext uri="{FF2B5EF4-FFF2-40B4-BE49-F238E27FC236}">
+                <a16:creationId xmlns:a16="http://schemas.microsoft.com/office/drawing/2014/main" id="{6A6AD034-0F65-47AF-9CAA-C4B0CEB30D4D}"/>
               </a:ext>
             </a:extLst>
           </p:cNvPr>
@@ -15072,10 +15318,10 @@
       </p:sp>
       <p:sp>
         <p:nvSpPr>
-          <p:cNvPr id="4" name="Slide Number Placeholder 3">
-            <a:extLst>
-              <a:ext uri="{FF2B5EF4-FFF2-40B4-BE49-F238E27FC236}">
-                <a16:creationId xmlns:a16="http://schemas.microsoft.com/office/drawing/2014/main" id="{83EEE9A2-09B3-BA3D-B64B-856A8F226637}"/>
+          <p:cNvPr id="4" name="Foliennummernplatzhalter 3">
+            <a:extLst>
+              <a:ext uri="{FF2B5EF4-FFF2-40B4-BE49-F238E27FC236}">
+                <a16:creationId xmlns:a16="http://schemas.microsoft.com/office/drawing/2014/main" id="{00F7E098-F740-40F7-A085-7034627D9148}"/>
               </a:ext>
             </a:extLst>
           </p:cNvPr>
@@ -15100,106 +15346,10 @@
           </a:p>
         </p:txBody>
       </p:sp>
-      <p:sp>
-        <p:nvSpPr>
-          <p:cNvPr id="5" name="Title 4">
-            <a:extLst>
-              <a:ext uri="{FF2B5EF4-FFF2-40B4-BE49-F238E27FC236}">
-                <a16:creationId xmlns:a16="http://schemas.microsoft.com/office/drawing/2014/main" id="{BBB354EA-F495-6050-38E7-B27B0D727096}"/>
-              </a:ext>
-            </a:extLst>
-          </p:cNvPr>
-          <p:cNvSpPr>
-            <a:spLocks noGrp="1"/>
-          </p:cNvSpPr>
-          <p:nvPr>
-            <p:ph type="title"/>
-          </p:nvPr>
-        </p:nvSpPr>
-        <p:spPr/>
-        <p:txBody>
-          <a:bodyPr/>
-          <a:lstStyle/>
-          <a:p>
-            <a:r>
-              <a:rPr lang="en-US" dirty="0"/>
-              <a:t>Introduction</a:t>
-            </a:r>
-          </a:p>
-        </p:txBody>
-      </p:sp>
-      <p:sp>
-        <p:nvSpPr>
-          <p:cNvPr id="6" name="Text Placeholder 5">
-            <a:extLst>
-              <a:ext uri="{FF2B5EF4-FFF2-40B4-BE49-F238E27FC236}">
-                <a16:creationId xmlns:a16="http://schemas.microsoft.com/office/drawing/2014/main" id="{4761E152-B7EF-00B5-47FF-110705BBE7D4}"/>
-              </a:ext>
-            </a:extLst>
-          </p:cNvPr>
-          <p:cNvSpPr>
-            <a:spLocks noGrp="1"/>
-          </p:cNvSpPr>
-          <p:nvPr>
-            <p:ph type="body" sz="quarter" idx="17"/>
-          </p:nvPr>
-        </p:nvSpPr>
-        <p:spPr/>
-        <p:txBody>
-          <a:bodyPr/>
-          <a:lstStyle/>
-          <a:p>
-            <a:r>
-              <a:rPr lang="en-US" dirty="0"/>
-              <a:t>ODEs describe nonlinear systems over time</a:t>
-            </a:r>
-          </a:p>
-          <a:p>
-            <a:r>
-              <a:rPr lang="en-US" dirty="0"/>
-              <a:t>Recurrent neural networks capable of nonlinearities and time series</a:t>
-            </a:r>
-          </a:p>
-          <a:p>
-            <a:r>
-              <a:rPr lang="en-US" dirty="0"/>
-              <a:t>Generation of training data</a:t>
-            </a:r>
-          </a:p>
-          <a:p>
-            <a:r>
-              <a:rPr lang="en-US" dirty="0"/>
-              <a:t>Hyperparameter search</a:t>
-            </a:r>
-          </a:p>
-          <a:p>
-            <a:endParaRPr lang="en-US" sz="1800" dirty="0">
-              <a:effectLst/>
-              <a:latin typeface="Calibri" panose="020F0502020204030204" pitchFamily="34" charset="0"/>
-              <a:ea typeface="Calibri" panose="020F0502020204030204" pitchFamily="34" charset="0"/>
-              <a:cs typeface="Arial" panose="020B0604020202020204" pitchFamily="34" charset="0"/>
-            </a:endParaRPr>
-          </a:p>
-          <a:p>
-            <a:endParaRPr lang="en-US" sz="1800" dirty="0">
-              <a:effectLst/>
-              <a:latin typeface="Calibri" panose="020F0502020204030204" pitchFamily="34" charset="0"/>
-              <a:ea typeface="Calibri" panose="020F0502020204030204" pitchFamily="34" charset="0"/>
-              <a:cs typeface="Arial" panose="020B0604020202020204" pitchFamily="34" charset="0"/>
-            </a:endParaRPr>
-          </a:p>
-          <a:p>
-            <a:endParaRPr lang="en-US" dirty="0"/>
-          </a:p>
-          <a:p>
-            <a:endParaRPr lang="en-US" dirty="0"/>
-          </a:p>
-        </p:txBody>
-      </p:sp>
     </p:spTree>
     <p:extLst>
       <p:ext uri="{BB962C8B-B14F-4D97-AF65-F5344CB8AC3E}">
-        <p14:creationId xmlns:p14="http://schemas.microsoft.com/office/powerpoint/2010/main" val="1027271806"/>
+        <p14:creationId xmlns:p14="http://schemas.microsoft.com/office/powerpoint/2010/main" val="1433872768"/>
       </p:ext>
     </p:extLst>
   </p:cSld>
@@ -15247,10 +15397,10 @@
           <a:bodyPr/>
           <a:lstStyle/>
           <a:p>
-            <a:fld id="{A2E8877F-2015-4290-957C-06EF82A52242}" type="datetime8">
-              <a:rPr lang="en-DE" smtClean="0"/>
-              <a:t>15/12/2022 12:38</a:t>
-            </a:fld>
+            <a:r>
+              <a:rPr lang="LID4096"/>
+              <a:t>12/01/2023</a:t>
+            </a:r>
             <a:endParaRPr lang="de-DE" dirty="0"/>
           </a:p>
         </p:txBody>
@@ -15508,10 +15658,10 @@
           <a:bodyPr/>
           <a:lstStyle/>
           <a:p>
-            <a:fld id="{A2E8877F-2015-4290-957C-06EF82A52242}" type="datetime8">
-              <a:rPr lang="en-DE" smtClean="0"/>
-              <a:t>15/12/2022 12:38</a:t>
-            </a:fld>
+            <a:r>
+              <a:rPr lang="LID4096"/>
+              <a:t>12/01/2023</a:t>
+            </a:r>
             <a:endParaRPr lang="de-DE" dirty="0"/>
           </a:p>
         </p:txBody>
@@ -16102,10 +16252,10 @@
           <a:bodyPr/>
           <a:lstStyle/>
           <a:p>
-            <a:fld id="{A2E8877F-2015-4290-957C-06EF82A52242}" type="datetime8">
-              <a:rPr lang="en-DE" smtClean="0"/>
-              <a:t>15/12/2022 12:38</a:t>
-            </a:fld>
+            <a:r>
+              <a:rPr lang="LID4096"/>
+              <a:t>12/01/2023</a:t>
+            </a:r>
             <a:endParaRPr lang="de-DE" dirty="0"/>
           </a:p>
         </p:txBody>
@@ -16853,43 +17003,10 @@
       </p:grpSpPr>
       <p:sp>
         <p:nvSpPr>
-          <p:cNvPr id="21" name="Titel 20">
-            <a:extLst>
-              <a:ext uri="{FF2B5EF4-FFF2-40B4-BE49-F238E27FC236}">
-                <a16:creationId xmlns:a16="http://schemas.microsoft.com/office/drawing/2014/main" id="{3018BD05-96D8-43F2-A6AA-CC40E7C32CCE}"/>
-              </a:ext>
-            </a:extLst>
-          </p:cNvPr>
-          <p:cNvSpPr>
-            <a:spLocks noGrp="1"/>
-          </p:cNvSpPr>
-          <p:nvPr>
-            <p:ph type="title"/>
-          </p:nvPr>
-        </p:nvSpPr>
-        <p:spPr>
-          <a:xfrm>
-            <a:off x="518318" y="3152001"/>
-            <a:ext cx="11157743" cy="553998"/>
-          </a:xfrm>
-        </p:spPr>
-        <p:txBody>
-          <a:bodyPr/>
-          <a:lstStyle/>
-          <a:p>
-            <a:r>
-              <a:rPr lang="de-DE" dirty="0"/>
-              <a:t>Methods</a:t>
-            </a:r>
-          </a:p>
-        </p:txBody>
-      </p:sp>
-      <p:sp>
-        <p:nvSpPr>
-          <p:cNvPr id="2" name="Datumsplatzhalter 1">
-            <a:extLst>
-              <a:ext uri="{FF2B5EF4-FFF2-40B4-BE49-F238E27FC236}">
-                <a16:creationId xmlns:a16="http://schemas.microsoft.com/office/drawing/2014/main" id="{FE7214E1-5D14-4D0B-BADD-2E239FECEC10}"/>
+          <p:cNvPr id="2" name="Date Placeholder 1">
+            <a:extLst>
+              <a:ext uri="{FF2B5EF4-FFF2-40B4-BE49-F238E27FC236}">
+                <a16:creationId xmlns:a16="http://schemas.microsoft.com/office/drawing/2014/main" id="{2B8CAAFC-F0E6-F31E-198A-AA24CC49C316}"/>
               </a:ext>
             </a:extLst>
           </p:cNvPr>
@@ -16905,20 +17022,20 @@
           <a:bodyPr/>
           <a:lstStyle/>
           <a:p>
-            <a:fld id="{C683496F-A479-4189-AF7A-49EC797A60BB}" type="datetime8">
-              <a:rPr lang="en-DE" smtClean="0"/>
-              <a:t>15/12/2022 12:38</a:t>
-            </a:fld>
+            <a:r>
+              <a:rPr lang="LID4096"/>
+              <a:t>12/01/2023</a:t>
+            </a:r>
             <a:endParaRPr lang="de-DE" dirty="0"/>
           </a:p>
         </p:txBody>
       </p:sp>
       <p:sp>
         <p:nvSpPr>
-          <p:cNvPr id="3" name="Fußzeilenplatzhalter 2">
-            <a:extLst>
-              <a:ext uri="{FF2B5EF4-FFF2-40B4-BE49-F238E27FC236}">
-                <a16:creationId xmlns:a16="http://schemas.microsoft.com/office/drawing/2014/main" id="{6A6AD034-0F65-47AF-9CAA-C4B0CEB30D4D}"/>
+          <p:cNvPr id="3" name="Footer Placeholder 2">
+            <a:extLst>
+              <a:ext uri="{FF2B5EF4-FFF2-40B4-BE49-F238E27FC236}">
+                <a16:creationId xmlns:a16="http://schemas.microsoft.com/office/drawing/2014/main" id="{C49146C1-0EFA-7410-35A6-1C2B33E3E160}"/>
               </a:ext>
             </a:extLst>
           </p:cNvPr>
@@ -16944,10 +17061,10 @@
       </p:sp>
       <p:sp>
         <p:nvSpPr>
-          <p:cNvPr id="4" name="Foliennummernplatzhalter 3">
-            <a:extLst>
-              <a:ext uri="{FF2B5EF4-FFF2-40B4-BE49-F238E27FC236}">
-                <a16:creationId xmlns:a16="http://schemas.microsoft.com/office/drawing/2014/main" id="{00F7E098-F740-40F7-A085-7034627D9148}"/>
+          <p:cNvPr id="4" name="Slide Number Placeholder 3">
+            <a:extLst>
+              <a:ext uri="{FF2B5EF4-FFF2-40B4-BE49-F238E27FC236}">
+                <a16:creationId xmlns:a16="http://schemas.microsoft.com/office/drawing/2014/main" id="{83EEE9A2-09B3-BA3D-B64B-856A8F226637}"/>
               </a:ext>
             </a:extLst>
           </p:cNvPr>
@@ -16972,10 +17089,106 @@
           </a:p>
         </p:txBody>
       </p:sp>
+      <p:sp>
+        <p:nvSpPr>
+          <p:cNvPr id="5" name="Title 4">
+            <a:extLst>
+              <a:ext uri="{FF2B5EF4-FFF2-40B4-BE49-F238E27FC236}">
+                <a16:creationId xmlns:a16="http://schemas.microsoft.com/office/drawing/2014/main" id="{BBB354EA-F495-6050-38E7-B27B0D727096}"/>
+              </a:ext>
+            </a:extLst>
+          </p:cNvPr>
+          <p:cNvSpPr>
+            <a:spLocks noGrp="1"/>
+          </p:cNvSpPr>
+          <p:nvPr>
+            <p:ph type="title"/>
+          </p:nvPr>
+        </p:nvSpPr>
+        <p:spPr/>
+        <p:txBody>
+          <a:bodyPr/>
+          <a:lstStyle/>
+          <a:p>
+            <a:r>
+              <a:rPr lang="en-US" dirty="0"/>
+              <a:t>Introduction</a:t>
+            </a:r>
+          </a:p>
+        </p:txBody>
+      </p:sp>
+      <p:sp>
+        <p:nvSpPr>
+          <p:cNvPr id="6" name="Text Placeholder 5">
+            <a:extLst>
+              <a:ext uri="{FF2B5EF4-FFF2-40B4-BE49-F238E27FC236}">
+                <a16:creationId xmlns:a16="http://schemas.microsoft.com/office/drawing/2014/main" id="{4761E152-B7EF-00B5-47FF-110705BBE7D4}"/>
+              </a:ext>
+            </a:extLst>
+          </p:cNvPr>
+          <p:cNvSpPr>
+            <a:spLocks noGrp="1"/>
+          </p:cNvSpPr>
+          <p:nvPr>
+            <p:ph type="body" sz="quarter" idx="17"/>
+          </p:nvPr>
+        </p:nvSpPr>
+        <p:spPr/>
+        <p:txBody>
+          <a:bodyPr/>
+          <a:lstStyle/>
+          <a:p>
+            <a:r>
+              <a:rPr lang="en-US" dirty="0"/>
+              <a:t>ODEs describe nonlinear systems over time</a:t>
+            </a:r>
+          </a:p>
+          <a:p>
+            <a:r>
+              <a:rPr lang="en-US" dirty="0"/>
+              <a:t>Recurrent neural networks capable of nonlinearities and time series</a:t>
+            </a:r>
+          </a:p>
+          <a:p>
+            <a:r>
+              <a:rPr lang="en-US" dirty="0"/>
+              <a:t>Generation of training data</a:t>
+            </a:r>
+          </a:p>
+          <a:p>
+            <a:r>
+              <a:rPr lang="en-US" dirty="0"/>
+              <a:t>Hyperparameter search</a:t>
+            </a:r>
+          </a:p>
+          <a:p>
+            <a:endParaRPr lang="en-US" sz="1800" dirty="0">
+              <a:effectLst/>
+              <a:latin typeface="Calibri" panose="020F0502020204030204" pitchFamily="34" charset="0"/>
+              <a:ea typeface="Calibri" panose="020F0502020204030204" pitchFamily="34" charset="0"/>
+              <a:cs typeface="Arial" panose="020B0604020202020204" pitchFamily="34" charset="0"/>
+            </a:endParaRPr>
+          </a:p>
+          <a:p>
+            <a:endParaRPr lang="en-US" sz="1800" dirty="0">
+              <a:effectLst/>
+              <a:latin typeface="Calibri" panose="020F0502020204030204" pitchFamily="34" charset="0"/>
+              <a:ea typeface="Calibri" panose="020F0502020204030204" pitchFamily="34" charset="0"/>
+              <a:cs typeface="Arial" panose="020B0604020202020204" pitchFamily="34" charset="0"/>
+            </a:endParaRPr>
+          </a:p>
+          <a:p>
+            <a:endParaRPr lang="en-US" dirty="0"/>
+          </a:p>
+          <a:p>
+            <a:endParaRPr lang="en-US" dirty="0"/>
+          </a:p>
+        </p:txBody>
+      </p:sp>
     </p:spTree>
     <p:extLst>
       <p:ext uri="{BB962C8B-B14F-4D97-AF65-F5344CB8AC3E}">
-        <p14:creationId xmlns:p14="http://schemas.microsoft.com/office/powerpoint/2010/main" val="3328393046"/>
+        <p14:creationId xmlns:p14="http://schemas.microsoft.com/office/powerpoint/2010/main" val="1027271806"/>
       </p:ext>
     </p:extLst>
   </p:cSld>
@@ -17004,10 +17217,43 @@
       </p:grpSpPr>
       <p:sp>
         <p:nvSpPr>
-          <p:cNvPr id="2" name="Date Placeholder 1">
-            <a:extLst>
-              <a:ext uri="{FF2B5EF4-FFF2-40B4-BE49-F238E27FC236}">
-                <a16:creationId xmlns:a16="http://schemas.microsoft.com/office/drawing/2014/main" id="{2B8CAAFC-F0E6-F31E-198A-AA24CC49C316}"/>
+          <p:cNvPr id="21" name="Titel 20">
+            <a:extLst>
+              <a:ext uri="{FF2B5EF4-FFF2-40B4-BE49-F238E27FC236}">
+                <a16:creationId xmlns:a16="http://schemas.microsoft.com/office/drawing/2014/main" id="{3018BD05-96D8-43F2-A6AA-CC40E7C32CCE}"/>
+              </a:ext>
+            </a:extLst>
+          </p:cNvPr>
+          <p:cNvSpPr>
+            <a:spLocks noGrp="1"/>
+          </p:cNvSpPr>
+          <p:nvPr>
+            <p:ph type="title"/>
+          </p:nvPr>
+        </p:nvSpPr>
+        <p:spPr>
+          <a:xfrm>
+            <a:off x="518318" y="3152001"/>
+            <a:ext cx="11157743" cy="553998"/>
+          </a:xfrm>
+        </p:spPr>
+        <p:txBody>
+          <a:bodyPr/>
+          <a:lstStyle/>
+          <a:p>
+            <a:r>
+              <a:rPr lang="de-DE" dirty="0"/>
+              <a:t>Methods</a:t>
+            </a:r>
+          </a:p>
+        </p:txBody>
+      </p:sp>
+      <p:sp>
+        <p:nvSpPr>
+          <p:cNvPr id="2" name="Datumsplatzhalter 1">
+            <a:extLst>
+              <a:ext uri="{FF2B5EF4-FFF2-40B4-BE49-F238E27FC236}">
+                <a16:creationId xmlns:a16="http://schemas.microsoft.com/office/drawing/2014/main" id="{FE7214E1-5D14-4D0B-BADD-2E239FECEC10}"/>
               </a:ext>
             </a:extLst>
           </p:cNvPr>
@@ -17023,20 +17269,20 @@
           <a:bodyPr/>
           <a:lstStyle/>
           <a:p>
-            <a:fld id="{A2E8877F-2015-4290-957C-06EF82A52242}" type="datetime8">
-              <a:rPr lang="en-DE" smtClean="0"/>
-              <a:t>15/12/2022 12:38</a:t>
-            </a:fld>
+            <a:r>
+              <a:rPr lang="LID4096"/>
+              <a:t>12/01/2023</a:t>
+            </a:r>
             <a:endParaRPr lang="de-DE" dirty="0"/>
           </a:p>
         </p:txBody>
       </p:sp>
       <p:sp>
         <p:nvSpPr>
-          <p:cNvPr id="3" name="Footer Placeholder 2">
-            <a:extLst>
-              <a:ext uri="{FF2B5EF4-FFF2-40B4-BE49-F238E27FC236}">
-                <a16:creationId xmlns:a16="http://schemas.microsoft.com/office/drawing/2014/main" id="{C49146C1-0EFA-7410-35A6-1C2B33E3E160}"/>
+          <p:cNvPr id="3" name="Fußzeilenplatzhalter 2">
+            <a:extLst>
+              <a:ext uri="{FF2B5EF4-FFF2-40B4-BE49-F238E27FC236}">
+                <a16:creationId xmlns:a16="http://schemas.microsoft.com/office/drawing/2014/main" id="{6A6AD034-0F65-47AF-9CAA-C4B0CEB30D4D}"/>
               </a:ext>
             </a:extLst>
           </p:cNvPr>
@@ -17062,10 +17308,10 @@
       </p:sp>
       <p:sp>
         <p:nvSpPr>
-          <p:cNvPr id="4" name="Slide Number Placeholder 3">
-            <a:extLst>
-              <a:ext uri="{FF2B5EF4-FFF2-40B4-BE49-F238E27FC236}">
-                <a16:creationId xmlns:a16="http://schemas.microsoft.com/office/drawing/2014/main" id="{83EEE9A2-09B3-BA3D-B64B-856A8F226637}"/>
+          <p:cNvPr id="4" name="Foliennummernplatzhalter 3">
+            <a:extLst>
+              <a:ext uri="{FF2B5EF4-FFF2-40B4-BE49-F238E27FC236}">
+                <a16:creationId xmlns:a16="http://schemas.microsoft.com/office/drawing/2014/main" id="{00F7E098-F740-40F7-A085-7034627D9148}"/>
               </a:ext>
             </a:extLst>
           </p:cNvPr>
@@ -17085,6 +17331,124 @@
               <a:rPr lang="de-DE" smtClean="0"/>
               <a:pPr/>
               <a:t>5</a:t>
+            </a:fld>
+            <a:endParaRPr lang="de-DE"/>
+          </a:p>
+        </p:txBody>
+      </p:sp>
+    </p:spTree>
+    <p:extLst>
+      <p:ext uri="{BB962C8B-B14F-4D97-AF65-F5344CB8AC3E}">
+        <p14:creationId xmlns:p14="http://schemas.microsoft.com/office/powerpoint/2010/main" val="3328393046"/>
+      </p:ext>
+    </p:extLst>
+  </p:cSld>
+  <p:clrMapOvr>
+    <a:masterClrMapping/>
+  </p:clrMapOvr>
+</p:sld>
+</file>
+
+<file path=ppt/slides/slide6.xml><?xml version="1.0" encoding="utf-8"?>
+<p:sld xmlns:a="http://schemas.openxmlformats.org/drawingml/2006/main" xmlns:r="http://schemas.openxmlformats.org/officeDocument/2006/relationships" xmlns:p="http://schemas.openxmlformats.org/presentationml/2006/main">
+  <p:cSld>
+    <p:spTree>
+      <p:nvGrpSpPr>
+        <p:cNvPr id="1" name=""/>
+        <p:cNvGrpSpPr/>
+        <p:nvPr/>
+      </p:nvGrpSpPr>
+      <p:grpSpPr>
+        <a:xfrm>
+          <a:off x="0" y="0"/>
+          <a:ext cx="0" cy="0"/>
+          <a:chOff x="0" y="0"/>
+          <a:chExt cx="0" cy="0"/>
+        </a:xfrm>
+      </p:grpSpPr>
+      <p:sp>
+        <p:nvSpPr>
+          <p:cNvPr id="2" name="Date Placeholder 1">
+            <a:extLst>
+              <a:ext uri="{FF2B5EF4-FFF2-40B4-BE49-F238E27FC236}">
+                <a16:creationId xmlns:a16="http://schemas.microsoft.com/office/drawing/2014/main" id="{2B8CAAFC-F0E6-F31E-198A-AA24CC49C316}"/>
+              </a:ext>
+            </a:extLst>
+          </p:cNvPr>
+          <p:cNvSpPr>
+            <a:spLocks noGrp="1"/>
+          </p:cNvSpPr>
+          <p:nvPr>
+            <p:ph type="dt" sz="half" idx="10"/>
+          </p:nvPr>
+        </p:nvSpPr>
+        <p:spPr/>
+        <p:txBody>
+          <a:bodyPr/>
+          <a:lstStyle/>
+          <a:p>
+            <a:r>
+              <a:rPr lang="LID4096"/>
+              <a:t>12/01/2023</a:t>
+            </a:r>
+            <a:endParaRPr lang="de-DE" dirty="0"/>
+          </a:p>
+        </p:txBody>
+      </p:sp>
+      <p:sp>
+        <p:nvSpPr>
+          <p:cNvPr id="3" name="Footer Placeholder 2">
+            <a:extLst>
+              <a:ext uri="{FF2B5EF4-FFF2-40B4-BE49-F238E27FC236}">
+                <a16:creationId xmlns:a16="http://schemas.microsoft.com/office/drawing/2014/main" id="{C49146C1-0EFA-7410-35A6-1C2B33E3E160}"/>
+              </a:ext>
+            </a:extLst>
+          </p:cNvPr>
+          <p:cNvSpPr>
+            <a:spLocks noGrp="1"/>
+          </p:cNvSpPr>
+          <p:nvPr>
+            <p:ph type="ftr" sz="quarter" idx="11"/>
+          </p:nvPr>
+        </p:nvSpPr>
+        <p:spPr/>
+        <p:txBody>
+          <a:bodyPr/>
+          <a:lstStyle/>
+          <a:p>
+            <a:r>
+              <a:rPr lang="en-US"/>
+              <a:t>Modeling of nonlinear Systems with LSTMs | Sebastian Hirt</a:t>
+            </a:r>
+            <a:endParaRPr lang="de-DE" dirty="0"/>
+          </a:p>
+        </p:txBody>
+      </p:sp>
+      <p:sp>
+        <p:nvSpPr>
+          <p:cNvPr id="4" name="Slide Number Placeholder 3">
+            <a:extLst>
+              <a:ext uri="{FF2B5EF4-FFF2-40B4-BE49-F238E27FC236}">
+                <a16:creationId xmlns:a16="http://schemas.microsoft.com/office/drawing/2014/main" id="{83EEE9A2-09B3-BA3D-B64B-856A8F226637}"/>
+              </a:ext>
+            </a:extLst>
+          </p:cNvPr>
+          <p:cNvSpPr>
+            <a:spLocks noGrp="1"/>
+          </p:cNvSpPr>
+          <p:nvPr>
+            <p:ph type="sldNum" sz="quarter" idx="12"/>
+          </p:nvPr>
+        </p:nvSpPr>
+        <p:spPr/>
+        <p:txBody>
+          <a:bodyPr/>
+          <a:lstStyle/>
+          <a:p>
+            <a:fld id="{D949F9DF-37BD-4CD6-BF49-65BA579E1D7A}" type="slidenum">
+              <a:rPr lang="de-DE" smtClean="0"/>
+              <a:pPr/>
+              <a:t>6</a:t>
             </a:fld>
             <a:endParaRPr lang="de-DE"/>
           </a:p>
@@ -17309,7 +17673,7 @@
 </p:sld>
 </file>
 
-<file path=ppt/slides/slide6.xml><?xml version="1.0" encoding="utf-8"?>
+<file path=ppt/slides/slide7.xml><?xml version="1.0" encoding="utf-8"?>
 <p:sld xmlns:a="http://schemas.openxmlformats.org/drawingml/2006/main" xmlns:r="http://schemas.openxmlformats.org/officeDocument/2006/relationships" xmlns:p="http://schemas.openxmlformats.org/presentationml/2006/main">
   <p:cSld>
     <p:spTree>
@@ -17347,10 +17711,10 @@
           <a:bodyPr/>
           <a:lstStyle/>
           <a:p>
-            <a:fld id="{A2E8877F-2015-4290-957C-06EF82A52242}" type="datetime8">
-              <a:rPr lang="en-DE" smtClean="0"/>
-              <a:t>15/12/2022 12:38</a:t>
-            </a:fld>
+            <a:r>
+              <a:rPr lang="LID4096"/>
+              <a:t>12/01/2023</a:t>
+            </a:r>
             <a:endParaRPr lang="de-DE" dirty="0"/>
           </a:p>
         </p:txBody>
@@ -17408,7 +17772,7 @@
             <a:fld id="{D949F9DF-37BD-4CD6-BF49-65BA579E1D7A}" type="slidenum">
               <a:rPr lang="de-DE" smtClean="0"/>
               <a:pPr/>
-              <a:t>6</a:t>
+              <a:t>7</a:t>
             </a:fld>
             <a:endParaRPr lang="de-DE"/>
           </a:p>
@@ -17731,7 +18095,7 @@
 </p:sld>
 </file>
 
-<file path=ppt/slides/slide7.xml><?xml version="1.0" encoding="utf-8"?>
+<file path=ppt/slides/slide8.xml><?xml version="1.0" encoding="utf-8"?>
 <p:sld xmlns:a="http://schemas.openxmlformats.org/drawingml/2006/main" xmlns:r="http://schemas.openxmlformats.org/officeDocument/2006/relationships" xmlns:p="http://schemas.openxmlformats.org/presentationml/2006/main">
   <p:cSld>
     <p:spTree>
@@ -17769,10 +18133,10 @@
           <a:bodyPr/>
           <a:lstStyle/>
           <a:p>
-            <a:fld id="{A2E8877F-2015-4290-957C-06EF82A52242}" type="datetime8">
-              <a:rPr lang="en-DE" smtClean="0"/>
-              <a:t>15/12/2022 12:38</a:t>
-            </a:fld>
+            <a:r>
+              <a:rPr lang="LID4096"/>
+              <a:t>12/01/2023</a:t>
+            </a:r>
             <a:endParaRPr lang="de-DE" dirty="0"/>
           </a:p>
         </p:txBody>
@@ -17830,7 +18194,7 @@
             <a:fld id="{D949F9DF-37BD-4CD6-BF49-65BA579E1D7A}" type="slidenum">
               <a:rPr lang="de-DE" smtClean="0"/>
               <a:pPr/>
-              <a:t>7</a:t>
+              <a:t>8</a:t>
             </a:fld>
             <a:endParaRPr lang="de-DE"/>
           </a:p>
@@ -17957,162 +18321,6 @@
     <p:extLst>
       <p:ext uri="{BB962C8B-B14F-4D97-AF65-F5344CB8AC3E}">
         <p14:creationId xmlns:p14="http://schemas.microsoft.com/office/powerpoint/2010/main" val="2562387972"/>
-      </p:ext>
-    </p:extLst>
-  </p:cSld>
-  <p:clrMapOvr>
-    <a:masterClrMapping/>
-  </p:clrMapOvr>
-</p:sld>
-</file>
-
-<file path=ppt/slides/slide8.xml><?xml version="1.0" encoding="utf-8"?>
-<p:sld xmlns:a="http://schemas.openxmlformats.org/drawingml/2006/main" xmlns:r="http://schemas.openxmlformats.org/officeDocument/2006/relationships" xmlns:p="http://schemas.openxmlformats.org/presentationml/2006/main">
-  <p:cSld>
-    <p:spTree>
-      <p:nvGrpSpPr>
-        <p:cNvPr id="1" name=""/>
-        <p:cNvGrpSpPr/>
-        <p:nvPr/>
-      </p:nvGrpSpPr>
-      <p:grpSpPr>
-        <a:xfrm>
-          <a:off x="0" y="0"/>
-          <a:ext cx="0" cy="0"/>
-          <a:chOff x="0" y="0"/>
-          <a:chExt cx="0" cy="0"/>
-        </a:xfrm>
-      </p:grpSpPr>
-      <p:sp>
-        <p:nvSpPr>
-          <p:cNvPr id="21" name="Titel 20">
-            <a:extLst>
-              <a:ext uri="{FF2B5EF4-FFF2-40B4-BE49-F238E27FC236}">
-                <a16:creationId xmlns:a16="http://schemas.microsoft.com/office/drawing/2014/main" id="{3018BD05-96D8-43F2-A6AA-CC40E7C32CCE}"/>
-              </a:ext>
-            </a:extLst>
-          </p:cNvPr>
-          <p:cNvSpPr>
-            <a:spLocks noGrp="1"/>
-          </p:cNvSpPr>
-          <p:nvPr>
-            <p:ph type="title"/>
-          </p:nvPr>
-        </p:nvSpPr>
-        <p:spPr>
-          <a:xfrm>
-            <a:off x="518318" y="3152001"/>
-            <a:ext cx="11157743" cy="553998"/>
-          </a:xfrm>
-        </p:spPr>
-        <p:txBody>
-          <a:bodyPr/>
-          <a:lstStyle/>
-          <a:p>
-            <a:r>
-              <a:rPr lang="de-DE" dirty="0"/>
-              <a:t>Dataset </a:t>
-            </a:r>
-            <a:r>
-              <a:rPr lang="de-DE" dirty="0" err="1"/>
-              <a:t>creation</a:t>
-            </a:r>
-            <a:endParaRPr lang="de-DE" dirty="0"/>
-          </a:p>
-        </p:txBody>
-      </p:sp>
-      <p:sp>
-        <p:nvSpPr>
-          <p:cNvPr id="2" name="Datumsplatzhalter 1">
-            <a:extLst>
-              <a:ext uri="{FF2B5EF4-FFF2-40B4-BE49-F238E27FC236}">
-                <a16:creationId xmlns:a16="http://schemas.microsoft.com/office/drawing/2014/main" id="{FE7214E1-5D14-4D0B-BADD-2E239FECEC10}"/>
-              </a:ext>
-            </a:extLst>
-          </p:cNvPr>
-          <p:cNvSpPr>
-            <a:spLocks noGrp="1"/>
-          </p:cNvSpPr>
-          <p:nvPr>
-            <p:ph type="dt" sz="half" idx="10"/>
-          </p:nvPr>
-        </p:nvSpPr>
-        <p:spPr/>
-        <p:txBody>
-          <a:bodyPr/>
-          <a:lstStyle/>
-          <a:p>
-            <a:fld id="{C683496F-A479-4189-AF7A-49EC797A60BB}" type="datetime8">
-              <a:rPr lang="en-DE" smtClean="0"/>
-              <a:t>15/12/2022 12:38</a:t>
-            </a:fld>
-            <a:endParaRPr lang="de-DE" dirty="0"/>
-          </a:p>
-        </p:txBody>
-      </p:sp>
-      <p:sp>
-        <p:nvSpPr>
-          <p:cNvPr id="3" name="Fußzeilenplatzhalter 2">
-            <a:extLst>
-              <a:ext uri="{FF2B5EF4-FFF2-40B4-BE49-F238E27FC236}">
-                <a16:creationId xmlns:a16="http://schemas.microsoft.com/office/drawing/2014/main" id="{6A6AD034-0F65-47AF-9CAA-C4B0CEB30D4D}"/>
-              </a:ext>
-            </a:extLst>
-          </p:cNvPr>
-          <p:cNvSpPr>
-            <a:spLocks noGrp="1"/>
-          </p:cNvSpPr>
-          <p:nvPr>
-            <p:ph type="ftr" sz="quarter" idx="11"/>
-          </p:nvPr>
-        </p:nvSpPr>
-        <p:spPr/>
-        <p:txBody>
-          <a:bodyPr/>
-          <a:lstStyle/>
-          <a:p>
-            <a:r>
-              <a:rPr lang="en-US"/>
-              <a:t>Modeling of nonlinear Systems with LSTMs | Sebastian Hirt</a:t>
-            </a:r>
-            <a:endParaRPr lang="de-DE" dirty="0"/>
-          </a:p>
-        </p:txBody>
-      </p:sp>
-      <p:sp>
-        <p:nvSpPr>
-          <p:cNvPr id="4" name="Foliennummernplatzhalter 3">
-            <a:extLst>
-              <a:ext uri="{FF2B5EF4-FFF2-40B4-BE49-F238E27FC236}">
-                <a16:creationId xmlns:a16="http://schemas.microsoft.com/office/drawing/2014/main" id="{00F7E098-F740-40F7-A085-7034627D9148}"/>
-              </a:ext>
-            </a:extLst>
-          </p:cNvPr>
-          <p:cNvSpPr>
-            <a:spLocks noGrp="1"/>
-          </p:cNvSpPr>
-          <p:nvPr>
-            <p:ph type="sldNum" sz="quarter" idx="12"/>
-          </p:nvPr>
-        </p:nvSpPr>
-        <p:spPr/>
-        <p:txBody>
-          <a:bodyPr/>
-          <a:lstStyle/>
-          <a:p>
-            <a:fld id="{D949F9DF-37BD-4CD6-BF49-65BA579E1D7A}" type="slidenum">
-              <a:rPr lang="de-DE" smtClean="0"/>
-              <a:pPr/>
-              <a:t>8</a:t>
-            </a:fld>
-            <a:endParaRPr lang="de-DE"/>
-          </a:p>
-        </p:txBody>
-      </p:sp>
-    </p:spTree>
-    <p:extLst>
-      <p:ext uri="{BB962C8B-B14F-4D97-AF65-F5344CB8AC3E}">
-        <p14:creationId xmlns:p14="http://schemas.microsoft.com/office/powerpoint/2010/main" val="998832571"/>
       </p:ext>
     </p:extLst>
   </p:cSld>
@@ -18141,10 +18349,48 @@
       </p:grpSpPr>
       <p:sp>
         <p:nvSpPr>
-          <p:cNvPr id="2" name="Date Placeholder 1">
-            <a:extLst>
-              <a:ext uri="{FF2B5EF4-FFF2-40B4-BE49-F238E27FC236}">
-                <a16:creationId xmlns:a16="http://schemas.microsoft.com/office/drawing/2014/main" id="{2B8CAAFC-F0E6-F31E-198A-AA24CC49C316}"/>
+          <p:cNvPr id="21" name="Titel 20">
+            <a:extLst>
+              <a:ext uri="{FF2B5EF4-FFF2-40B4-BE49-F238E27FC236}">
+                <a16:creationId xmlns:a16="http://schemas.microsoft.com/office/drawing/2014/main" id="{3018BD05-96D8-43F2-A6AA-CC40E7C32CCE}"/>
+              </a:ext>
+            </a:extLst>
+          </p:cNvPr>
+          <p:cNvSpPr>
+            <a:spLocks noGrp="1"/>
+          </p:cNvSpPr>
+          <p:nvPr>
+            <p:ph type="title"/>
+          </p:nvPr>
+        </p:nvSpPr>
+        <p:spPr>
+          <a:xfrm>
+            <a:off x="518318" y="3152001"/>
+            <a:ext cx="11157743" cy="553998"/>
+          </a:xfrm>
+        </p:spPr>
+        <p:txBody>
+          <a:bodyPr/>
+          <a:lstStyle/>
+          <a:p>
+            <a:r>
+              <a:rPr lang="de-DE" dirty="0"/>
+              <a:t>Dataset </a:t>
+            </a:r>
+            <a:r>
+              <a:rPr lang="de-DE" dirty="0" err="1"/>
+              <a:t>creation</a:t>
+            </a:r>
+            <a:endParaRPr lang="de-DE" dirty="0"/>
+          </a:p>
+        </p:txBody>
+      </p:sp>
+      <p:sp>
+        <p:nvSpPr>
+          <p:cNvPr id="2" name="Datumsplatzhalter 1">
+            <a:extLst>
+              <a:ext uri="{FF2B5EF4-FFF2-40B4-BE49-F238E27FC236}">
+                <a16:creationId xmlns:a16="http://schemas.microsoft.com/office/drawing/2014/main" id="{FE7214E1-5D14-4D0B-BADD-2E239FECEC10}"/>
               </a:ext>
             </a:extLst>
           </p:cNvPr>
@@ -18160,20 +18406,20 @@
           <a:bodyPr/>
           <a:lstStyle/>
           <a:p>
-            <a:fld id="{A2E8877F-2015-4290-957C-06EF82A52242}" type="datetime8">
-              <a:rPr lang="en-DE" smtClean="0"/>
-              <a:t>15/12/2022 12:38</a:t>
-            </a:fld>
+            <a:r>
+              <a:rPr lang="LID4096"/>
+              <a:t>12/01/2023</a:t>
+            </a:r>
             <a:endParaRPr lang="de-DE" dirty="0"/>
           </a:p>
         </p:txBody>
       </p:sp>
       <p:sp>
         <p:nvSpPr>
-          <p:cNvPr id="3" name="Footer Placeholder 2">
-            <a:extLst>
-              <a:ext uri="{FF2B5EF4-FFF2-40B4-BE49-F238E27FC236}">
-                <a16:creationId xmlns:a16="http://schemas.microsoft.com/office/drawing/2014/main" id="{C49146C1-0EFA-7410-35A6-1C2B33E3E160}"/>
+          <p:cNvPr id="3" name="Fußzeilenplatzhalter 2">
+            <a:extLst>
+              <a:ext uri="{FF2B5EF4-FFF2-40B4-BE49-F238E27FC236}">
+                <a16:creationId xmlns:a16="http://schemas.microsoft.com/office/drawing/2014/main" id="{6A6AD034-0F65-47AF-9CAA-C4B0CEB30D4D}"/>
               </a:ext>
             </a:extLst>
           </p:cNvPr>
@@ -18199,10 +18445,10 @@
       </p:sp>
       <p:sp>
         <p:nvSpPr>
-          <p:cNvPr id="4" name="Slide Number Placeholder 3">
-            <a:extLst>
-              <a:ext uri="{FF2B5EF4-FFF2-40B4-BE49-F238E27FC236}">
-                <a16:creationId xmlns:a16="http://schemas.microsoft.com/office/drawing/2014/main" id="{83EEE9A2-09B3-BA3D-B64B-856A8F226637}"/>
+          <p:cNvPr id="4" name="Foliennummernplatzhalter 3">
+            <a:extLst>
+              <a:ext uri="{FF2B5EF4-FFF2-40B4-BE49-F238E27FC236}">
+                <a16:creationId xmlns:a16="http://schemas.microsoft.com/office/drawing/2014/main" id="{00F7E098-F740-40F7-A085-7034627D9148}"/>
               </a:ext>
             </a:extLst>
           </p:cNvPr>
@@ -18227,131 +18473,10 @@
           </a:p>
         </p:txBody>
       </p:sp>
-      <p:sp>
-        <p:nvSpPr>
-          <p:cNvPr id="5" name="Title 4">
-            <a:extLst>
-              <a:ext uri="{FF2B5EF4-FFF2-40B4-BE49-F238E27FC236}">
-                <a16:creationId xmlns:a16="http://schemas.microsoft.com/office/drawing/2014/main" id="{BBB354EA-F495-6050-38E7-B27B0D727096}"/>
-              </a:ext>
-            </a:extLst>
-          </p:cNvPr>
-          <p:cNvSpPr>
-            <a:spLocks noGrp="1"/>
-          </p:cNvSpPr>
-          <p:nvPr>
-            <p:ph type="title"/>
-          </p:nvPr>
-        </p:nvSpPr>
-        <p:spPr/>
-        <p:txBody>
-          <a:bodyPr/>
-          <a:lstStyle/>
-          <a:p>
-            <a:r>
-              <a:rPr lang="en-US" dirty="0"/>
-              <a:t>Problem description</a:t>
-            </a:r>
-          </a:p>
-        </p:txBody>
-      </p:sp>
-      <p:sp>
-        <p:nvSpPr>
-          <p:cNvPr id="6" name="Text Placeholder 5">
-            <a:extLst>
-              <a:ext uri="{FF2B5EF4-FFF2-40B4-BE49-F238E27FC236}">
-                <a16:creationId xmlns:a16="http://schemas.microsoft.com/office/drawing/2014/main" id="{4761E152-B7EF-00B5-47FF-110705BBE7D4}"/>
-              </a:ext>
-            </a:extLst>
-          </p:cNvPr>
-          <p:cNvSpPr>
-            <a:spLocks noGrp="1"/>
-          </p:cNvSpPr>
-          <p:nvPr>
-            <p:ph type="body" sz="quarter" idx="17"/>
-          </p:nvPr>
-        </p:nvSpPr>
-        <p:spPr/>
-        <p:txBody>
-          <a:bodyPr/>
-          <a:lstStyle/>
-          <a:p>
-            <a:r>
-              <a:rPr lang="en-US" sz="1800" dirty="0">
-                <a:effectLst/>
-                <a:latin typeface="Calibri" panose="020F0502020204030204" pitchFamily="34" charset="0"/>
-                <a:ea typeface="Calibri" panose="020F0502020204030204" pitchFamily="34" charset="0"/>
-                <a:cs typeface="Arial" panose="020B0604020202020204" pitchFamily="34" charset="0"/>
-              </a:rPr>
-              <a:t>Pushing force on object</a:t>
-            </a:r>
-          </a:p>
-          <a:p>
-            <a:r>
-              <a:rPr lang="en-US" dirty="0">
-                <a:latin typeface="Calibri" panose="020F0502020204030204" pitchFamily="34" charset="0"/>
-                <a:ea typeface="Calibri" panose="020F0502020204030204" pitchFamily="34" charset="0"/>
-                <a:cs typeface="Arial" panose="020B0604020202020204" pitchFamily="34" charset="0"/>
-              </a:rPr>
-              <a:t>Drag on object</a:t>
-            </a:r>
-            <a:endParaRPr lang="en-US" sz="1800" dirty="0">
-              <a:effectLst/>
-              <a:latin typeface="Calibri" panose="020F0502020204030204" pitchFamily="34" charset="0"/>
-              <a:ea typeface="Calibri" panose="020F0502020204030204" pitchFamily="34" charset="0"/>
-              <a:cs typeface="Arial" panose="020B0604020202020204" pitchFamily="34" charset="0"/>
-            </a:endParaRPr>
-          </a:p>
-          <a:p>
-            <a:endParaRPr lang="en-US" sz="1800" dirty="0">
-              <a:effectLst/>
-              <a:latin typeface="Calibri" panose="020F0502020204030204" pitchFamily="34" charset="0"/>
-              <a:ea typeface="Calibri" panose="020F0502020204030204" pitchFamily="34" charset="0"/>
-              <a:cs typeface="Arial" panose="020B0604020202020204" pitchFamily="34" charset="0"/>
-            </a:endParaRPr>
-          </a:p>
-          <a:p>
-            <a:endParaRPr lang="en-US" dirty="0"/>
-          </a:p>
-          <a:p>
-            <a:endParaRPr lang="en-US" dirty="0"/>
-          </a:p>
-        </p:txBody>
-      </p:sp>
-      <p:pic>
-        <p:nvPicPr>
-          <p:cNvPr id="8" name="Picture 7">
-            <a:extLst>
-              <a:ext uri="{FF2B5EF4-FFF2-40B4-BE49-F238E27FC236}">
-                <a16:creationId xmlns:a16="http://schemas.microsoft.com/office/drawing/2014/main" id="{6F9EFDD3-455A-5D88-E91B-55A19B6A2BBD}"/>
-              </a:ext>
-            </a:extLst>
-          </p:cNvPr>
-          <p:cNvPicPr>
-            <a:picLocks noChangeAspect="1"/>
-          </p:cNvPicPr>
-          <p:nvPr/>
-        </p:nvPicPr>
-        <p:blipFill>
-          <a:blip r:embed="rId2"/>
-          <a:stretch>
-            <a:fillRect/>
-          </a:stretch>
-        </p:blipFill>
-        <p:spPr>
-          <a:xfrm>
-            <a:off x="5500915" y="2089245"/>
-            <a:ext cx="4914238" cy="3538785"/>
-          </a:xfrm>
-          <a:prstGeom prst="rect">
-            <a:avLst/>
-          </a:prstGeom>
-        </p:spPr>
-      </p:pic>
     </p:spTree>
     <p:extLst>
       <p:ext uri="{BB962C8B-B14F-4D97-AF65-F5344CB8AC3E}">
-        <p14:creationId xmlns:p14="http://schemas.microsoft.com/office/powerpoint/2010/main" val="637827353"/>
+        <p14:creationId xmlns:p14="http://schemas.microsoft.com/office/powerpoint/2010/main" val="998832571"/>
       </p:ext>
     </p:extLst>
   </p:cSld>
@@ -19298,18 +19423,18 @@
 </file>
 
 <file path=customXml/item1.xml><?xml version="1.0" encoding="utf-8"?>
-<p:properties xmlns:p="http://schemas.microsoft.com/office/2006/metadata/properties" xmlns:xsi="http://www.w3.org/2001/XMLSchema-instance" xmlns:pc="http://schemas.microsoft.com/office/infopath/2007/PartnerControls">
-  <documentManagement/>
-</p:properties>
-</file>
-
-<file path=customXml/item2.xml><?xml version="1.0" encoding="utf-8"?>
 <?mso-contentType ?>
 <FormTemplates xmlns="http://schemas.microsoft.com/sharepoint/v3/contenttype/forms">
   <Display>DocumentLibraryForm</Display>
   <Edit>DocumentLibraryForm</Edit>
   <New>DocumentLibraryForm</New>
 </FormTemplates>
+</file>
+
+<file path=customXml/item2.xml><?xml version="1.0" encoding="utf-8"?>
+<p:properties xmlns:p="http://schemas.microsoft.com/office/2006/metadata/properties" xmlns:xsi="http://www.w3.org/2001/XMLSchema-instance" xmlns:pc="http://schemas.microsoft.com/office/infopath/2007/PartnerControls">
+  <documentManagement/>
+</p:properties>
 </file>
 
 <file path=customXml/item3.xml><?xml version="1.0" encoding="utf-8"?>
@@ -19536,6 +19661,14 @@
 </file>
 
 <file path=customXml/itemProps1.xml><?xml version="1.0" encoding="utf-8"?>
+<ds:datastoreItem xmlns:ds="http://schemas.openxmlformats.org/officeDocument/2006/customXml" ds:itemID="{E457329C-FB5F-4A4D-B331-82D30E9A7432}">
+  <ds:schemaRefs>
+    <ds:schemaRef ds:uri="http://schemas.microsoft.com/sharepoint/v3/contenttype/forms"/>
+  </ds:schemaRefs>
+</ds:datastoreItem>
+</file>
+
+<file path=customXml/itemProps2.xml><?xml version="1.0" encoding="utf-8"?>
 <ds:datastoreItem xmlns:ds="http://schemas.openxmlformats.org/officeDocument/2006/customXml" ds:itemID="{CC1A7FE3-81F7-4596-A188-3EE8D4188E1F}">
   <ds:schemaRefs>
     <ds:schemaRef ds:uri="http://schemas.microsoft.com/office/2006/documentManagement/types"/>
@@ -19548,14 +19681,6 @@
     <ds:schemaRef ds:uri="5d4c14f1-5e26-4315-944b-e10ebb29e5be"/>
     <ds:schemaRef ds:uri="http://schemas.microsoft.com/office/2006/metadata/properties"/>
     <ds:schemaRef ds:uri="http://purl.org/dc/dcmitype/"/>
-  </ds:schemaRefs>
-</ds:datastoreItem>
-</file>
-
-<file path=customXml/itemProps2.xml><?xml version="1.0" encoding="utf-8"?>
-<ds:datastoreItem xmlns:ds="http://schemas.openxmlformats.org/officeDocument/2006/customXml" ds:itemID="{E457329C-FB5F-4A4D-B331-82D30E9A7432}">
-  <ds:schemaRefs>
-    <ds:schemaRef ds:uri="http://schemas.microsoft.com/sharepoint/v3/contenttype/forms"/>
   </ds:schemaRefs>
 </ds:datastoreItem>
 </file>

</xml_diff>